<commit_message>
Update UGDG for yuntongzhang (#183)
* Update UserGuide for checkin checkout viewdiets

* Update sequence according to tutor's comment
</commit_message>
<xml_diff>
--- a/docs/diagrams/AdddietSequenceDiagram.pptx
+++ b/docs/diagrams/AdddietSequenceDiagram.pptx
@@ -208,7 +208,7 @@
           <a:p>
             <a:fld id="{F5CC4B3F-88C1-4FFA-B1B6-F41C21DC6924}" type="datetimeFigureOut">
               <a:rPr lang="en-US" smtClean="0"/>
-              <a:t>10/16/2018</a:t>
+              <a:t>11/10/2018</a:t>
             </a:fld>
             <a:endParaRPr lang="en-US"/>
           </a:p>
@@ -738,7 +738,7 @@
           <a:p>
             <a:fld id="{78C97017-6FC3-485B-9764-EAC9E56C1D49}" type="datetimeFigureOut">
               <a:rPr lang="en-US" smtClean="0"/>
-              <a:t>10/16/2018</a:t>
+              <a:t>11/10/2018</a:t>
             </a:fld>
             <a:endParaRPr lang="en-US"/>
           </a:p>
@@ -906,7 +906,7 @@
           <a:p>
             <a:fld id="{78C97017-6FC3-485B-9764-EAC9E56C1D49}" type="datetimeFigureOut">
               <a:rPr lang="en-US" smtClean="0"/>
-              <a:t>10/16/2018</a:t>
+              <a:t>11/10/2018</a:t>
             </a:fld>
             <a:endParaRPr lang="en-US"/>
           </a:p>
@@ -1084,7 +1084,7 @@
           <a:p>
             <a:fld id="{78C97017-6FC3-485B-9764-EAC9E56C1D49}" type="datetimeFigureOut">
               <a:rPr lang="en-US" smtClean="0"/>
-              <a:t>10/16/2018</a:t>
+              <a:t>11/10/2018</a:t>
             </a:fld>
             <a:endParaRPr lang="en-US"/>
           </a:p>
@@ -1252,7 +1252,7 @@
           <a:p>
             <a:fld id="{78C97017-6FC3-485B-9764-EAC9E56C1D49}" type="datetimeFigureOut">
               <a:rPr lang="en-US" smtClean="0"/>
-              <a:t>10/16/2018</a:t>
+              <a:t>11/10/2018</a:t>
             </a:fld>
             <a:endParaRPr lang="en-US"/>
           </a:p>
@@ -1497,7 +1497,7 @@
           <a:p>
             <a:fld id="{78C97017-6FC3-485B-9764-EAC9E56C1D49}" type="datetimeFigureOut">
               <a:rPr lang="en-US" smtClean="0"/>
-              <a:t>10/16/2018</a:t>
+              <a:t>11/10/2018</a:t>
             </a:fld>
             <a:endParaRPr lang="en-US"/>
           </a:p>
@@ -1782,7 +1782,7 @@
           <a:p>
             <a:fld id="{78C97017-6FC3-485B-9764-EAC9E56C1D49}" type="datetimeFigureOut">
               <a:rPr lang="en-US" smtClean="0"/>
-              <a:t>10/16/2018</a:t>
+              <a:t>11/10/2018</a:t>
             </a:fld>
             <a:endParaRPr lang="en-US"/>
           </a:p>
@@ -2201,7 +2201,7 @@
           <a:p>
             <a:fld id="{78C97017-6FC3-485B-9764-EAC9E56C1D49}" type="datetimeFigureOut">
               <a:rPr lang="en-US" smtClean="0"/>
-              <a:t>10/16/2018</a:t>
+              <a:t>11/10/2018</a:t>
             </a:fld>
             <a:endParaRPr lang="en-US"/>
           </a:p>
@@ -2318,7 +2318,7 @@
           <a:p>
             <a:fld id="{78C97017-6FC3-485B-9764-EAC9E56C1D49}" type="datetimeFigureOut">
               <a:rPr lang="en-US" smtClean="0"/>
-              <a:t>10/16/2018</a:t>
+              <a:t>11/10/2018</a:t>
             </a:fld>
             <a:endParaRPr lang="en-US"/>
           </a:p>
@@ -2413,7 +2413,7 @@
           <a:p>
             <a:fld id="{78C97017-6FC3-485B-9764-EAC9E56C1D49}" type="datetimeFigureOut">
               <a:rPr lang="en-US" smtClean="0"/>
-              <a:t>10/16/2018</a:t>
+              <a:t>11/10/2018</a:t>
             </a:fld>
             <a:endParaRPr lang="en-US"/>
           </a:p>
@@ -2688,7 +2688,7 @@
           <a:p>
             <a:fld id="{78C97017-6FC3-485B-9764-EAC9E56C1D49}" type="datetimeFigureOut">
               <a:rPr lang="en-US" smtClean="0"/>
-              <a:t>10/16/2018</a:t>
+              <a:t>11/10/2018</a:t>
             </a:fld>
             <a:endParaRPr lang="en-US"/>
           </a:p>
@@ -2940,7 +2940,7 @@
           <a:p>
             <a:fld id="{78C97017-6FC3-485B-9764-EAC9E56C1D49}" type="datetimeFigureOut">
               <a:rPr lang="en-US" smtClean="0"/>
-              <a:t>10/16/2018</a:t>
+              <a:t>11/10/2018</a:t>
             </a:fld>
             <a:endParaRPr lang="en-US"/>
           </a:p>
@@ -3151,7 +3151,7 @@
           <a:p>
             <a:fld id="{78C97017-6FC3-485B-9764-EAC9E56C1D49}" type="datetimeFigureOut">
               <a:rPr lang="en-US" smtClean="0"/>
-              <a:t>10/16/2018</a:t>
+              <a:t>11/10/2018</a:t>
             </a:fld>
             <a:endParaRPr lang="en-US"/>
           </a:p>
@@ -3595,7 +3595,7 @@
         </p:nvSpPr>
         <p:spPr>
           <a:xfrm>
-            <a:off x="47796" y="163017"/>
+            <a:off x="47796" y="135025"/>
             <a:ext cx="7782903" cy="5746986"/>
           </a:xfrm>
           <a:prstGeom prst="roundRect">
@@ -4008,8 +4008,8 @@
         </p:nvSpPr>
         <p:spPr>
           <a:xfrm>
-            <a:off x="5456801" y="1595828"/>
-            <a:ext cx="162711" cy="1080759"/>
+            <a:off x="5456801" y="1948368"/>
+            <a:ext cx="180691" cy="728219"/>
           </a:xfrm>
           <a:prstGeom prst="rect">
             <a:avLst/>
@@ -4174,7 +4174,7 @@
         </p:nvCxnSpPr>
         <p:spPr>
           <a:xfrm>
-            <a:off x="4113158" y="1847956"/>
+            <a:off x="4105445" y="1958265"/>
             <a:ext cx="1370490" cy="1"/>
           </a:xfrm>
           <a:prstGeom prst="straightConnector1">
@@ -4972,9 +4972,9 @@
           <p:nvPr/>
         </p:nvCxnSpPr>
         <p:spPr>
-          <a:xfrm>
-            <a:off x="1708245" y="1363918"/>
-            <a:ext cx="2256705" cy="1"/>
+          <a:xfrm flipV="1">
+            <a:off x="1592902" y="1368489"/>
+            <a:ext cx="2393107" cy="5833"/>
           </a:xfrm>
           <a:prstGeom prst="straightConnector1">
             <a:avLst/>
@@ -5274,8 +5274,8 @@
         </p:nvSpPr>
         <p:spPr>
           <a:xfrm>
-            <a:off x="4369555" y="1619356"/>
-            <a:ext cx="933080" cy="369332"/>
+            <a:off x="4376452" y="1728835"/>
+            <a:ext cx="933080" cy="169277"/>
           </a:xfrm>
           <a:prstGeom prst="rect">
             <a:avLst/>
@@ -5301,7 +5301,7 @@
           <a:p>
             <a:pPr algn="ctr"/>
             <a:r>
-              <a:rPr lang="en-US" sz="1200" dirty="0"/>
+              <a:rPr lang="en-US" sz="1100" dirty="0"/>
               <a:t>parse(“type/…”)</a:t>
             </a:r>
           </a:p>
@@ -5367,7 +5367,7 @@
         </p:nvCxnSpPr>
         <p:spPr>
           <a:xfrm>
-            <a:off x="5637492" y="1991672"/>
+            <a:off x="5637492" y="2061735"/>
             <a:ext cx="958629" cy="0"/>
           </a:xfrm>
           <a:prstGeom prst="straightConnector1">
@@ -5406,13 +5406,14 @@
           </p:cNvPr>
           <p:cNvCxnSpPr>
             <a:cxnSpLocks/>
+            <a:endCxn id="74" idx="0"/>
           </p:cNvCxnSpPr>
           <p:nvPr/>
         </p:nvCxnSpPr>
         <p:spPr>
-          <a:xfrm>
-            <a:off x="5533902" y="2032200"/>
-            <a:ext cx="0" cy="926908"/>
+          <a:xfrm flipH="1">
+            <a:off x="5565582" y="1615556"/>
+            <a:ext cx="318" cy="1357087"/>
           </a:xfrm>
           <a:prstGeom prst="line">
             <a:avLst/>
@@ -6391,7 +6392,7 @@
         </p:nvSpPr>
         <p:spPr>
           <a:xfrm>
-            <a:off x="5418476" y="2908611"/>
+            <a:off x="5436380" y="2910957"/>
             <a:ext cx="258404" cy="261610"/>
           </a:xfrm>
           <a:prstGeom prst="rect">
@@ -6416,6 +6417,147 @@
           </a:p>
         </p:txBody>
       </p:sp>
+      <p:sp>
+        <p:nvSpPr>
+          <p:cNvPr id="72" name="Rectangle 71">
+            <a:extLst>
+              <a:ext uri="{FF2B5EF4-FFF2-40B4-BE49-F238E27FC236}">
+                <a16:creationId xmlns:a16="http://schemas.microsoft.com/office/drawing/2014/main" id="{C3D4CF51-AC72-465A-B8B3-4B322A4A9219}"/>
+              </a:ext>
+            </a:extLst>
+          </p:cNvPr>
+          <p:cNvSpPr/>
+          <p:nvPr/>
+        </p:nvSpPr>
+        <p:spPr>
+          <a:xfrm>
+            <a:off x="5456801" y="1603561"/>
+            <a:ext cx="180691" cy="120333"/>
+          </a:xfrm>
+          <a:prstGeom prst="rect">
+            <a:avLst/>
+          </a:prstGeom>
+          <a:solidFill>
+            <a:srgbClr val="0070C0"/>
+          </a:solidFill>
+          <a:ln>
+            <a:solidFill>
+              <a:srgbClr val="0070C0"/>
+            </a:solidFill>
+          </a:ln>
+          <a:effectLst/>
+        </p:spPr>
+        <p:style>
+          <a:lnRef idx="1">
+            <a:schemeClr val="accent3"/>
+          </a:lnRef>
+          <a:fillRef idx="2">
+            <a:schemeClr val="accent3"/>
+          </a:fillRef>
+          <a:effectRef idx="1">
+            <a:schemeClr val="accent3"/>
+          </a:effectRef>
+          <a:fontRef idx="minor">
+            <a:schemeClr val="dk1"/>
+          </a:fontRef>
+        </p:style>
+        <p:txBody>
+          <a:bodyPr rtlCol="0" anchor="ctr"/>
+          <a:lstStyle/>
+          <a:p>
+            <a:pPr algn="ctr"/>
+            <a:endParaRPr lang="en-SG" sz="1400"/>
+          </a:p>
+        </p:txBody>
+      </p:sp>
+      <p:cxnSp>
+        <p:nvCxnSpPr>
+          <p:cNvPr id="9" name="Straight Arrow Connector 8">
+            <a:extLst>
+              <a:ext uri="{FF2B5EF4-FFF2-40B4-BE49-F238E27FC236}">
+                <a16:creationId xmlns:a16="http://schemas.microsoft.com/office/drawing/2014/main" id="{D5F4B502-C6A5-4160-B399-74C770EB2702}"/>
+              </a:ext>
+            </a:extLst>
+          </p:cNvPr>
+          <p:cNvCxnSpPr/>
+          <p:nvPr/>
+        </p:nvCxnSpPr>
+        <p:spPr>
+          <a:xfrm flipH="1">
+            <a:off x="7221847" y="3910521"/>
+            <a:ext cx="57052" cy="0"/>
+          </a:xfrm>
+          <a:prstGeom prst="straightConnector1">
+            <a:avLst/>
+          </a:prstGeom>
+          <a:ln>
+            <a:solidFill>
+              <a:schemeClr val="accent1">
+                <a:lumMod val="75000"/>
+              </a:schemeClr>
+            </a:solidFill>
+            <a:tailEnd type="triangle"/>
+          </a:ln>
+        </p:spPr>
+        <p:style>
+          <a:lnRef idx="1">
+            <a:schemeClr val="accent1"/>
+          </a:lnRef>
+          <a:fillRef idx="0">
+            <a:schemeClr val="accent1"/>
+          </a:fillRef>
+          <a:effectRef idx="0">
+            <a:schemeClr val="accent1"/>
+          </a:effectRef>
+          <a:fontRef idx="minor">
+            <a:schemeClr val="tx1"/>
+          </a:fontRef>
+        </p:style>
+      </p:cxnSp>
+      <p:cxnSp>
+        <p:nvCxnSpPr>
+          <p:cNvPr id="11" name="Straight Arrow Connector 10">
+            <a:extLst>
+              <a:ext uri="{FF2B5EF4-FFF2-40B4-BE49-F238E27FC236}">
+                <a16:creationId xmlns:a16="http://schemas.microsoft.com/office/drawing/2014/main" id="{58962282-B2CB-4584-BB30-9014B61069A4}"/>
+              </a:ext>
+            </a:extLst>
+          </p:cNvPr>
+          <p:cNvCxnSpPr/>
+          <p:nvPr/>
+        </p:nvCxnSpPr>
+        <p:spPr>
+          <a:xfrm flipH="1">
+            <a:off x="7207554" y="4635983"/>
+            <a:ext cx="71345" cy="0"/>
+          </a:xfrm>
+          <a:prstGeom prst="straightConnector1">
+            <a:avLst/>
+          </a:prstGeom>
+          <a:ln>
+            <a:solidFill>
+              <a:schemeClr val="accent1">
+                <a:lumMod val="75000"/>
+              </a:schemeClr>
+            </a:solidFill>
+            <a:tailEnd type="triangle"/>
+          </a:ln>
+        </p:spPr>
+        <p:style>
+          <a:lnRef idx="1">
+            <a:schemeClr val="accent1"/>
+          </a:lnRef>
+          <a:fillRef idx="0">
+            <a:schemeClr val="accent1"/>
+          </a:fillRef>
+          <a:effectRef idx="0">
+            <a:schemeClr val="accent1"/>
+          </a:effectRef>
+          <a:fontRef idx="minor">
+            <a:schemeClr val="tx1"/>
+          </a:fontRef>
+        </p:style>
+      </p:cxnSp>
     </p:spTree>
     <p:extLst>
       <p:ext uri="{BB962C8B-B14F-4D97-AF65-F5344CB8AC3E}">

</xml_diff>

<commit_message>
Yuntong UG DG PPP (#225)
* Update yuntongzhang PPP

* Update sequence diagram

* Add testing instructions

* Minor fixes

* Update sequence diagram

* Add diagram in UserGuide
</commit_message>
<xml_diff>
--- a/docs/diagrams/AdddietSequenceDiagram.pptx
+++ b/docs/diagrams/AdddietSequenceDiagram.pptx
@@ -208,7 +208,7 @@
           <a:p>
             <a:fld id="{F5CC4B3F-88C1-4FFA-B1B6-F41C21DC6924}" type="datetimeFigureOut">
               <a:rPr lang="en-US" smtClean="0"/>
-              <a:t>11/10/2018</a:t>
+              <a:t>11/12/2018</a:t>
             </a:fld>
             <a:endParaRPr lang="en-US"/>
           </a:p>
@@ -738,7 +738,7 @@
           <a:p>
             <a:fld id="{78C97017-6FC3-485B-9764-EAC9E56C1D49}" type="datetimeFigureOut">
               <a:rPr lang="en-US" smtClean="0"/>
-              <a:t>11/10/2018</a:t>
+              <a:t>11/12/2018</a:t>
             </a:fld>
             <a:endParaRPr lang="en-US"/>
           </a:p>
@@ -906,7 +906,7 @@
           <a:p>
             <a:fld id="{78C97017-6FC3-485B-9764-EAC9E56C1D49}" type="datetimeFigureOut">
               <a:rPr lang="en-US" smtClean="0"/>
-              <a:t>11/10/2018</a:t>
+              <a:t>11/12/2018</a:t>
             </a:fld>
             <a:endParaRPr lang="en-US"/>
           </a:p>
@@ -1084,7 +1084,7 @@
           <a:p>
             <a:fld id="{78C97017-6FC3-485B-9764-EAC9E56C1D49}" type="datetimeFigureOut">
               <a:rPr lang="en-US" smtClean="0"/>
-              <a:t>11/10/2018</a:t>
+              <a:t>11/12/2018</a:t>
             </a:fld>
             <a:endParaRPr lang="en-US"/>
           </a:p>
@@ -1252,7 +1252,7 @@
           <a:p>
             <a:fld id="{78C97017-6FC3-485B-9764-EAC9E56C1D49}" type="datetimeFigureOut">
               <a:rPr lang="en-US" smtClean="0"/>
-              <a:t>11/10/2018</a:t>
+              <a:t>11/12/2018</a:t>
             </a:fld>
             <a:endParaRPr lang="en-US"/>
           </a:p>
@@ -1497,7 +1497,7 @@
           <a:p>
             <a:fld id="{78C97017-6FC3-485B-9764-EAC9E56C1D49}" type="datetimeFigureOut">
               <a:rPr lang="en-US" smtClean="0"/>
-              <a:t>11/10/2018</a:t>
+              <a:t>11/12/2018</a:t>
             </a:fld>
             <a:endParaRPr lang="en-US"/>
           </a:p>
@@ -1782,7 +1782,7 @@
           <a:p>
             <a:fld id="{78C97017-6FC3-485B-9764-EAC9E56C1D49}" type="datetimeFigureOut">
               <a:rPr lang="en-US" smtClean="0"/>
-              <a:t>11/10/2018</a:t>
+              <a:t>11/12/2018</a:t>
             </a:fld>
             <a:endParaRPr lang="en-US"/>
           </a:p>
@@ -2201,7 +2201,7 @@
           <a:p>
             <a:fld id="{78C97017-6FC3-485B-9764-EAC9E56C1D49}" type="datetimeFigureOut">
               <a:rPr lang="en-US" smtClean="0"/>
-              <a:t>11/10/2018</a:t>
+              <a:t>11/12/2018</a:t>
             </a:fld>
             <a:endParaRPr lang="en-US"/>
           </a:p>
@@ -2318,7 +2318,7 @@
           <a:p>
             <a:fld id="{78C97017-6FC3-485B-9764-EAC9E56C1D49}" type="datetimeFigureOut">
               <a:rPr lang="en-US" smtClean="0"/>
-              <a:t>11/10/2018</a:t>
+              <a:t>11/12/2018</a:t>
             </a:fld>
             <a:endParaRPr lang="en-US"/>
           </a:p>
@@ -2413,7 +2413,7 @@
           <a:p>
             <a:fld id="{78C97017-6FC3-485B-9764-EAC9E56C1D49}" type="datetimeFigureOut">
               <a:rPr lang="en-US" smtClean="0"/>
-              <a:t>11/10/2018</a:t>
+              <a:t>11/12/2018</a:t>
             </a:fld>
             <a:endParaRPr lang="en-US"/>
           </a:p>
@@ -2688,7 +2688,7 @@
           <a:p>
             <a:fld id="{78C97017-6FC3-485B-9764-EAC9E56C1D49}" type="datetimeFigureOut">
               <a:rPr lang="en-US" smtClean="0"/>
-              <a:t>11/10/2018</a:t>
+              <a:t>11/12/2018</a:t>
             </a:fld>
             <a:endParaRPr lang="en-US"/>
           </a:p>
@@ -2940,7 +2940,7 @@
           <a:p>
             <a:fld id="{78C97017-6FC3-485B-9764-EAC9E56C1D49}" type="datetimeFigureOut">
               <a:rPr lang="en-US" smtClean="0"/>
-              <a:t>11/10/2018</a:t>
+              <a:t>11/12/2018</a:t>
             </a:fld>
             <a:endParaRPr lang="en-US"/>
           </a:p>
@@ -3151,7 +3151,7 @@
           <a:p>
             <a:fld id="{78C97017-6FC3-485B-9764-EAC9E56C1D49}" type="datetimeFigureOut">
               <a:rPr lang="en-US" smtClean="0"/>
-              <a:t>11/10/2018</a:t>
+              <a:t>11/12/2018</a:t>
             </a:fld>
             <a:endParaRPr lang="en-US"/>
           </a:p>
@@ -3534,8 +3534,8 @@
         </p:nvSpPr>
         <p:spPr>
           <a:xfrm>
-            <a:off x="7916308" y="163017"/>
-            <a:ext cx="3818492" cy="5767083"/>
+            <a:off x="9361115" y="152400"/>
+            <a:ext cx="3451961" cy="5861781"/>
           </a:xfrm>
           <a:prstGeom prst="roundRect">
             <a:avLst>
@@ -3595,8 +3595,8 @@
         </p:nvSpPr>
         <p:spPr>
           <a:xfrm>
-            <a:off x="47796" y="135025"/>
-            <a:ext cx="7782903" cy="5746986"/>
+            <a:off x="47796" y="152400"/>
+            <a:ext cx="9226877" cy="5828022"/>
           </a:xfrm>
           <a:prstGeom prst="roundRect">
             <a:avLst>
@@ -3850,7 +3850,7 @@
                   <a:schemeClr val="bg1"/>
                 </a:solidFill>
               </a:rPr>
-              <a:t>:Address</a:t>
+              <a:t>:Health</a:t>
             </a:r>
           </a:p>
           <a:p>
@@ -3861,7 +3861,7 @@
                   <a:schemeClr val="bg1"/>
                 </a:solidFill>
               </a:rPr>
-              <a:t>BookParser</a:t>
+              <a:t>BaseParser</a:t>
             </a:r>
             <a:endParaRPr lang="en-SG" sz="1600" dirty="0">
               <a:solidFill>
@@ -4008,8 +4008,8 @@
         </p:nvSpPr>
         <p:spPr>
           <a:xfrm>
-            <a:off x="5456801" y="1948368"/>
-            <a:ext cx="180691" cy="728219"/>
+            <a:off x="5456801" y="1595829"/>
+            <a:ext cx="162711" cy="126428"/>
           </a:xfrm>
           <a:prstGeom prst="rect">
             <a:avLst/>
@@ -4091,7 +4091,7 @@
         </p:nvSpPr>
         <p:spPr>
           <a:xfrm>
-            <a:off x="120994" y="1311579"/>
+            <a:off x="140229" y="1304917"/>
             <a:ext cx="1424582" cy="615553"/>
           </a:xfrm>
           <a:prstGeom prst="rect">
@@ -4119,7 +4119,7 @@
                   <a:srgbClr val="0070C0"/>
                 </a:solidFill>
               </a:rPr>
-              <a:t>addappt</a:t>
+              <a:t>adddiet</a:t>
             </a:r>
             <a:r>
               <a:rPr lang="en-US" sz="1000" dirty="0">
@@ -4143,7 +4143,7 @@
                   <a:srgbClr val="0070C0"/>
                 </a:solidFill>
               </a:rPr>
-              <a:t>/S1234567A type/SRG </a:t>
+              <a:t>/S1234567A </a:t>
             </a:r>
             <a:r>
               <a:rPr lang="en-US" sz="1000" dirty="0" err="1">
@@ -4151,7 +4151,7 @@
                   <a:srgbClr val="0070C0"/>
                 </a:solidFill>
               </a:rPr>
-              <a:t>pn</a:t>
+              <a:t>alg</a:t>
             </a:r>
             <a:r>
               <a:rPr lang="en-US" sz="1000" dirty="0">
@@ -4159,7 +4159,57 @@
                   <a:srgbClr val="0070C0"/>
                 </a:solidFill>
               </a:rPr>
-              <a:t>/Heart Bypass dt/27-04-19 1030 doc/Dr. Pepper”)</a:t>
+              <a:t>/Egg </a:t>
+            </a:r>
+          </a:p>
+          <a:p>
+            <a:r>
+              <a:rPr lang="en-US" sz="1000" dirty="0" err="1">
+                <a:solidFill>
+                  <a:srgbClr val="0070C0"/>
+                </a:solidFill>
+              </a:rPr>
+              <a:t>alg</a:t>
+            </a:r>
+            <a:r>
+              <a:rPr lang="en-US" sz="1000" dirty="0">
+                <a:solidFill>
+                  <a:srgbClr val="0070C0"/>
+                </a:solidFill>
+              </a:rPr>
+              <a:t>/Milk </a:t>
+            </a:r>
+            <a:r>
+              <a:rPr lang="en-US" sz="1000" dirty="0" err="1">
+                <a:solidFill>
+                  <a:srgbClr val="0070C0"/>
+                </a:solidFill>
+              </a:rPr>
+              <a:t>cr</a:t>
+            </a:r>
+            <a:r>
+              <a:rPr lang="en-US" sz="1000" dirty="0">
+                <a:solidFill>
+                  <a:srgbClr val="0070C0"/>
+                </a:solidFill>
+              </a:rPr>
+              <a:t>/Halal </a:t>
+            </a:r>
+            <a:r>
+              <a:rPr lang="en-US" sz="1000" dirty="0" err="1">
+                <a:solidFill>
+                  <a:srgbClr val="0070C0"/>
+                </a:solidFill>
+              </a:rPr>
+              <a:t>pd</a:t>
+            </a:r>
+            <a:r>
+              <a:rPr lang="en-US" sz="1000" dirty="0">
+                <a:solidFill>
+                  <a:srgbClr val="0070C0"/>
+                </a:solidFill>
+              </a:rPr>
+              <a:t>/Hands cannot move.”)</a:t>
             </a:r>
           </a:p>
         </p:txBody>
@@ -4174,7 +4224,7 @@
         </p:nvCxnSpPr>
         <p:spPr>
           <a:xfrm>
-            <a:off x="4105445" y="1958265"/>
+            <a:off x="4082185" y="1914755"/>
             <a:ext cx="1370490" cy="1"/>
           </a:xfrm>
           <a:prstGeom prst="straightConnector1">
@@ -4293,7 +4343,7 @@
         </p:nvCxnSpPr>
         <p:spPr>
           <a:xfrm>
-            <a:off x="1660929" y="2833640"/>
+            <a:off x="1637344" y="2838886"/>
             <a:ext cx="2348067" cy="0"/>
           </a:xfrm>
           <a:prstGeom prst="straightConnector1">
@@ -4416,8 +4466,8 @@
         </p:nvSpPr>
         <p:spPr>
           <a:xfrm>
-            <a:off x="1885189" y="1106150"/>
-            <a:ext cx="1899551" cy="184666"/>
+            <a:off x="1816321" y="1106150"/>
+            <a:ext cx="1968419" cy="184666"/>
           </a:xfrm>
           <a:prstGeom prst="rect">
             <a:avLst/>
@@ -4451,7 +4501,7 @@
             </a:r>
             <a:r>
               <a:rPr lang="en-US" sz="1200" dirty="0" err="1"/>
-              <a:t>addappt</a:t>
+              <a:t>adddiet</a:t>
             </a:r>
             <a:r>
               <a:rPr lang="en-US" sz="1200" dirty="0"/>
@@ -4548,8 +4598,8 @@
         </p:nvSpPr>
         <p:spPr>
           <a:xfrm>
-            <a:off x="9422067" y="4252564"/>
-            <a:ext cx="2181777" cy="335427"/>
+            <a:off x="10868559" y="4365889"/>
+            <a:ext cx="1466097" cy="335427"/>
           </a:xfrm>
           <a:prstGeom prst="rect">
             <a:avLst/>
@@ -4597,7 +4647,7 @@
                   <a:schemeClr val="bg1"/>
                 </a:solidFill>
               </a:rPr>
-              <a:t>VersionedAddressBook</a:t>
+              <a:t>HealthBase</a:t>
             </a:r>
             <a:endParaRPr lang="en-SG" sz="1600" dirty="0">
               <a:solidFill>
@@ -4615,7 +4665,7 @@
         </p:nvSpPr>
         <p:spPr>
           <a:xfrm>
-            <a:off x="10454855" y="4994578"/>
+            <a:off x="11533132" y="5128355"/>
             <a:ext cx="130250" cy="263220"/>
           </a:xfrm>
           <a:prstGeom prst="rect">
@@ -4702,7 +4752,7 @@
         </p:nvSpPr>
         <p:spPr>
           <a:xfrm>
-            <a:off x="8341278" y="2837489"/>
+            <a:off x="9381100" y="968800"/>
             <a:ext cx="841636" cy="300180"/>
           </a:xfrm>
           <a:prstGeom prst="rect">
@@ -4743,7 +4793,7 @@
                   <a:schemeClr val="bg1"/>
                 </a:solidFill>
               </a:rPr>
-              <a:t>: Model</a:t>
+              <a:t>:Model</a:t>
             </a:r>
             <a:endParaRPr lang="en-SG" sz="1600" dirty="0">
               <a:solidFill>
@@ -4758,13 +4808,14 @@
           <p:cNvPr id="46" name="Straight Connector 45"/>
           <p:cNvCxnSpPr>
             <a:cxnSpLocks/>
+            <a:stCxn id="40" idx="2"/>
           </p:cNvCxnSpPr>
           <p:nvPr/>
         </p:nvCxnSpPr>
         <p:spPr>
-          <a:xfrm flipH="1">
-            <a:off x="8726530" y="3120076"/>
-            <a:ext cx="8756" cy="2594920"/>
+          <a:xfrm>
+            <a:off x="9801918" y="1268980"/>
+            <a:ext cx="2889" cy="4579793"/>
           </a:xfrm>
           <a:prstGeom prst="line">
             <a:avLst/>
@@ -4794,61 +4845,14 @@
       </p:cxnSp>
       <p:sp>
         <p:nvSpPr>
-          <p:cNvPr id="49" name="Rectangle 48"/>
-          <p:cNvSpPr/>
-          <p:nvPr/>
-        </p:nvSpPr>
-        <p:spPr>
-          <a:xfrm>
-            <a:off x="8648967" y="3541191"/>
-            <a:ext cx="172569" cy="398562"/>
-          </a:xfrm>
-          <a:prstGeom prst="rect">
-            <a:avLst/>
-          </a:prstGeom>
-          <a:solidFill>
-            <a:srgbClr val="7030A0"/>
-          </a:solidFill>
-          <a:ln>
-            <a:solidFill>
-              <a:srgbClr val="7030A0"/>
-            </a:solidFill>
-          </a:ln>
-          <a:effectLst/>
-        </p:spPr>
-        <p:style>
-          <a:lnRef idx="1">
-            <a:schemeClr val="accent3"/>
-          </a:lnRef>
-          <a:fillRef idx="2">
-            <a:schemeClr val="accent3"/>
-          </a:fillRef>
-          <a:effectRef idx="1">
-            <a:schemeClr val="accent3"/>
-          </a:effectRef>
-          <a:fontRef idx="minor">
-            <a:schemeClr val="dk1"/>
-          </a:fontRef>
-        </p:style>
-        <p:txBody>
-          <a:bodyPr rtlCol="0" anchor="ctr"/>
-          <a:lstStyle/>
-          <a:p>
-            <a:pPr algn="ctr"/>
-            <a:endParaRPr lang="en-SG" sz="1400"/>
-          </a:p>
-        </p:txBody>
-      </p:sp>
-      <p:sp>
-        <p:nvSpPr>
           <p:cNvPr id="19" name="Rectangle 62"/>
           <p:cNvSpPr/>
           <p:nvPr/>
         </p:nvSpPr>
         <p:spPr>
           <a:xfrm>
-            <a:off x="6596121" y="1624216"/>
-            <a:ext cx="1093635" cy="461538"/>
+            <a:off x="6596121" y="1303619"/>
+            <a:ext cx="1127409" cy="782135"/>
           </a:xfrm>
           <a:prstGeom prst="rect">
             <a:avLst/>
@@ -4888,7 +4892,7 @@
                   <a:schemeClr val="bg1"/>
                 </a:solidFill>
               </a:rPr>
-              <a:t>u:AddAppt</a:t>
+              <a:t>u:AddDiet</a:t>
             </a:r>
             <a:br>
               <a:rPr lang="en-US" sz="1600" dirty="0">
@@ -4972,9 +4976,9 @@
           <p:nvPr/>
         </p:nvCxnSpPr>
         <p:spPr>
-          <a:xfrm flipV="1">
-            <a:off x="1592902" y="1368489"/>
-            <a:ext cx="2393107" cy="5833"/>
+          <a:xfrm>
+            <a:off x="1592902" y="1393593"/>
+            <a:ext cx="2374439" cy="1"/>
           </a:xfrm>
           <a:prstGeom prst="straightConnector1">
             <a:avLst/>
@@ -5063,7 +5067,7 @@
         </p:nvCxnSpPr>
         <p:spPr>
           <a:xfrm>
-            <a:off x="10519825" y="4479081"/>
+            <a:off x="11598102" y="4612858"/>
             <a:ext cx="9149" cy="1075298"/>
           </a:xfrm>
           <a:prstGeom prst="line">
@@ -5089,47 +5093,6 @@
           </a:effectRef>
           <a:fontRef idx="minor">
             <a:schemeClr val="dk1"/>
-          </a:fontRef>
-        </p:style>
-      </p:cxnSp>
-      <p:cxnSp>
-        <p:nvCxnSpPr>
-          <p:cNvPr id="13" name="Curved Connector 12"/>
-          <p:cNvCxnSpPr>
-            <a:cxnSpLocks/>
-          </p:cNvCxnSpPr>
-          <p:nvPr/>
-        </p:nvCxnSpPr>
-        <p:spPr>
-          <a:xfrm rot="16200000" flipH="1">
-            <a:off x="7186578" y="4135377"/>
-            <a:ext cx="156923" cy="76200"/>
-          </a:xfrm>
-          <a:prstGeom prst="curvedConnector4">
-            <a:avLst>
-              <a:gd name="adj1" fmla="val -32706"/>
-              <a:gd name="adj2" fmla="val 338776"/>
-            </a:avLst>
-          </a:prstGeom>
-          <a:ln>
-            <a:solidFill>
-              <a:srgbClr val="7030A0"/>
-            </a:solidFill>
-            <a:tailEnd type="triangle"/>
-          </a:ln>
-        </p:spPr>
-        <p:style>
-          <a:lnRef idx="1">
-            <a:schemeClr val="accent1"/>
-          </a:lnRef>
-          <a:fillRef idx="0">
-            <a:schemeClr val="accent1"/>
-          </a:fillRef>
-          <a:effectRef idx="0">
-            <a:schemeClr val="accent1"/>
-          </a:effectRef>
-          <a:fontRef idx="minor">
-            <a:schemeClr val="tx1"/>
           </a:fontRef>
         </p:style>
       </p:cxnSp>
@@ -5143,7 +5106,7 @@
         </p:nvCxnSpPr>
         <p:spPr>
           <a:xfrm>
-            <a:off x="8818751" y="5029200"/>
+            <a:off x="9897028" y="5138583"/>
             <a:ext cx="1636104" cy="0"/>
           </a:xfrm>
           <a:prstGeom prst="straightConnector1">
@@ -5234,7 +5197,7 @@
                   <a:schemeClr val="bg1"/>
                 </a:solidFill>
               </a:rPr>
-              <a:t>AddAppt</a:t>
+              <a:t>AddDiet</a:t>
             </a:r>
             <a:endParaRPr lang="en-US" sz="1600" dirty="0">
               <a:solidFill>
@@ -5274,8 +5237,8 @@
         </p:nvSpPr>
         <p:spPr>
           <a:xfrm>
-            <a:off x="4376452" y="1728835"/>
-            <a:ext cx="933080" cy="169277"/>
+            <a:off x="4338582" y="1686155"/>
+            <a:ext cx="933080" cy="184666"/>
           </a:xfrm>
           <a:prstGeom prst="rect">
             <a:avLst/>
@@ -5301,8 +5264,16 @@
           <a:p>
             <a:pPr algn="ctr"/>
             <a:r>
-              <a:rPr lang="en-US" sz="1100" dirty="0"/>
-              <a:t>parse(“type/…”)</a:t>
+              <a:rPr lang="en-US" sz="1200" dirty="0"/>
+              <a:t>parse(“</a:t>
+            </a:r>
+            <a:r>
+              <a:rPr lang="en-US" sz="1200" dirty="0" err="1"/>
+              <a:t>alg</a:t>
+            </a:r>
+            <a:r>
+              <a:rPr lang="en-US" sz="1200" dirty="0"/>
+              <a:t>/…”)</a:t>
             </a:r>
           </a:p>
         </p:txBody>
@@ -5367,7 +5338,7 @@
         </p:nvCxnSpPr>
         <p:spPr>
           <a:xfrm>
-            <a:off x="5637492" y="2061735"/>
+            <a:off x="5637492" y="1981200"/>
             <a:ext cx="958629" cy="0"/>
           </a:xfrm>
           <a:prstGeom prst="straightConnector1">
@@ -5406,14 +5377,14 @@
           </p:cNvPr>
           <p:cNvCxnSpPr>
             <a:cxnSpLocks/>
-            <a:endCxn id="74" idx="0"/>
+            <a:stCxn id="21" idx="0"/>
           </p:cNvCxnSpPr>
           <p:nvPr/>
         </p:nvCxnSpPr>
         <p:spPr>
           <a:xfrm flipH="1">
-            <a:off x="5565582" y="1615556"/>
-            <a:ext cx="318" cy="1357087"/>
+            <a:off x="5533903" y="1595829"/>
+            <a:ext cx="4254" cy="1363279"/>
           </a:xfrm>
           <a:prstGeom prst="line">
             <a:avLst/>
@@ -5588,10 +5559,58 @@
       </p:sp>
       <p:sp>
         <p:nvSpPr>
-          <p:cNvPr id="78" name="Rectangle 77">
+          <p:cNvPr id="109" name="TextBox 108">
             <a:extLst>
               <a:ext uri="{FF2B5EF4-FFF2-40B4-BE49-F238E27FC236}">
-                <a16:creationId xmlns:a16="http://schemas.microsoft.com/office/drawing/2014/main" id="{363E1D8D-F4DB-4C9A-91AD-FBCD72DF1279}"/>
+                <a16:creationId xmlns:a16="http://schemas.microsoft.com/office/drawing/2014/main" id="{30C24B92-2290-44CB-9020-4D42B429F330}"/>
+              </a:ext>
+            </a:extLst>
+          </p:cNvPr>
+          <p:cNvSpPr txBox="1"/>
+          <p:nvPr/>
+        </p:nvSpPr>
+        <p:spPr>
+          <a:xfrm>
+            <a:off x="7264237" y="3830947"/>
+            <a:ext cx="1126374" cy="153888"/>
+          </a:xfrm>
+          <a:prstGeom prst="rect">
+            <a:avLst/>
+          </a:prstGeom>
+          <a:noFill/>
+        </p:spPr>
+        <p:txBody>
+          <a:bodyPr wrap="square" lIns="0" tIns="0" rIns="0" bIns="0" rtlCol="0">
+            <a:spAutoFit/>
+          </a:bodyPr>
+          <a:lstStyle>
+            <a:defPPr>
+              <a:defRPr lang="en-US"/>
+            </a:defPPr>
+            <a:lvl1pPr algn="r">
+              <a:defRPr sz="1400">
+                <a:solidFill>
+                  <a:srgbClr val="0070C0"/>
+                </a:solidFill>
+              </a:defRPr>
+            </a:lvl1pPr>
+          </a:lstStyle>
+          <a:p>
+            <a:pPr algn="ctr"/>
+            <a:r>
+              <a:rPr lang="en-US" sz="1000" dirty="0" err="1"/>
+              <a:t>patientToUpdate</a:t>
+            </a:r>
+            <a:endParaRPr lang="en-US" sz="1000" dirty="0"/>
+          </a:p>
+        </p:txBody>
+      </p:sp>
+      <p:sp>
+        <p:nvSpPr>
+          <p:cNvPr id="111" name="Rectangle 110">
+            <a:extLst>
+              <a:ext uri="{FF2B5EF4-FFF2-40B4-BE49-F238E27FC236}">
+                <a16:creationId xmlns:a16="http://schemas.microsoft.com/office/drawing/2014/main" id="{BD973D4F-BD7B-4AF2-BC82-4B2E161DB5D8}"/>
               </a:ext>
             </a:extLst>
           </p:cNvPr>
@@ -5600,18 +5619,18 @@
         </p:nvSpPr>
         <p:spPr>
           <a:xfrm>
-            <a:off x="7150203" y="4258434"/>
-            <a:ext cx="183653" cy="184665"/>
+            <a:off x="9710053" y="5056246"/>
+            <a:ext cx="183730" cy="414435"/>
           </a:xfrm>
           <a:prstGeom prst="rect">
             <a:avLst/>
           </a:prstGeom>
           <a:solidFill>
-            <a:srgbClr val="0070C0"/>
+            <a:srgbClr val="7030A0"/>
           </a:solidFill>
           <a:ln>
             <a:solidFill>
-              <a:srgbClr val="0070C0"/>
+              <a:srgbClr val="7030A0"/>
             </a:solidFill>
           </a:ln>
           <a:effectLst/>
@@ -5641,227 +5660,6 @@
       </p:sp>
       <p:cxnSp>
         <p:nvCxnSpPr>
-          <p:cNvPr id="98" name="Connector: Curved 97">
-            <a:extLst>
-              <a:ext uri="{FF2B5EF4-FFF2-40B4-BE49-F238E27FC236}">
-                <a16:creationId xmlns:a16="http://schemas.microsoft.com/office/drawing/2014/main" id="{03D66233-E61F-4981-9344-1CA16E716E4C}"/>
-              </a:ext>
-            </a:extLst>
-          </p:cNvPr>
-          <p:cNvCxnSpPr>
-            <a:cxnSpLocks/>
-          </p:cNvCxnSpPr>
-          <p:nvPr/>
-        </p:nvCxnSpPr>
-        <p:spPr>
-          <a:xfrm flipH="1">
-            <a:off x="7212922" y="4435996"/>
-            <a:ext cx="131954" cy="199987"/>
-          </a:xfrm>
-          <a:prstGeom prst="curvedConnector4">
-            <a:avLst>
-              <a:gd name="adj1" fmla="val -53034"/>
-              <a:gd name="adj2" fmla="val 101078"/>
-            </a:avLst>
-          </a:prstGeom>
-          <a:ln w="9525" cap="flat" cmpd="sng" algn="ctr">
-            <a:solidFill>
-              <a:schemeClr val="dk1"/>
-            </a:solidFill>
-            <a:prstDash val="dash"/>
-            <a:round/>
-            <a:headEnd type="none" w="med" len="med"/>
-            <a:tailEnd type="none" w="med" len="med"/>
-          </a:ln>
-        </p:spPr>
-        <p:style>
-          <a:lnRef idx="0">
-            <a:scrgbClr r="0" g="0" b="0"/>
-          </a:lnRef>
-          <a:fillRef idx="0">
-            <a:scrgbClr r="0" g="0" b="0"/>
-          </a:fillRef>
-          <a:effectRef idx="0">
-            <a:scrgbClr r="0" g="0" b="0"/>
-          </a:effectRef>
-          <a:fontRef idx="minor">
-            <a:schemeClr val="tx1"/>
-          </a:fontRef>
-        </p:style>
-      </p:cxnSp>
-      <p:sp>
-        <p:nvSpPr>
-          <p:cNvPr id="107" name="TextBox 106">
-            <a:extLst>
-              <a:ext uri="{FF2B5EF4-FFF2-40B4-BE49-F238E27FC236}">
-                <a16:creationId xmlns:a16="http://schemas.microsoft.com/office/drawing/2014/main" id="{7AF2EA8A-B78E-4891-91C8-11D738D03B15}"/>
-              </a:ext>
-            </a:extLst>
-          </p:cNvPr>
-          <p:cNvSpPr txBox="1"/>
-          <p:nvPr/>
-        </p:nvSpPr>
-        <p:spPr>
-          <a:xfrm>
-            <a:off x="7343899" y="4030036"/>
-            <a:ext cx="1474852" cy="153888"/>
-          </a:xfrm>
-          <a:prstGeom prst="rect">
-            <a:avLst/>
-          </a:prstGeom>
-          <a:noFill/>
-        </p:spPr>
-        <p:txBody>
-          <a:bodyPr wrap="square" lIns="0" tIns="0" rIns="0" bIns="0" rtlCol="0">
-            <a:spAutoFit/>
-          </a:bodyPr>
-          <a:lstStyle>
-            <a:defPPr>
-              <a:defRPr lang="en-US"/>
-            </a:defPPr>
-            <a:lvl1pPr algn="r">
-              <a:defRPr sz="1400">
-                <a:solidFill>
-                  <a:srgbClr val="0070C0"/>
-                </a:solidFill>
-              </a:defRPr>
-            </a:lvl1pPr>
-          </a:lstStyle>
-          <a:p>
-            <a:pPr algn="ctr"/>
-            <a:r>
-              <a:rPr lang="en-US" sz="1000" dirty="0" err="1">
-                <a:solidFill>
-                  <a:schemeClr val="accent4">
-                    <a:lumMod val="75000"/>
-                  </a:schemeClr>
-                </a:solidFill>
-              </a:rPr>
-              <a:t>addDietsForPerson</a:t>
-            </a:r>
-            <a:r>
-              <a:rPr lang="en-US" sz="1000" dirty="0">
-                <a:solidFill>
-                  <a:schemeClr val="accent4">
-                    <a:lumMod val="75000"/>
-                  </a:schemeClr>
-                </a:solidFill>
-              </a:rPr>
-              <a:t>(…)</a:t>
-            </a:r>
-            <a:endParaRPr lang="en-US" sz="1000" dirty="0"/>
-          </a:p>
-        </p:txBody>
-      </p:sp>
-      <p:sp>
-        <p:nvSpPr>
-          <p:cNvPr id="109" name="TextBox 108">
-            <a:extLst>
-              <a:ext uri="{FF2B5EF4-FFF2-40B4-BE49-F238E27FC236}">
-                <a16:creationId xmlns:a16="http://schemas.microsoft.com/office/drawing/2014/main" id="{30C24B92-2290-44CB-9020-4D42B429F330}"/>
-              </a:ext>
-            </a:extLst>
-          </p:cNvPr>
-          <p:cNvSpPr txBox="1"/>
-          <p:nvPr/>
-        </p:nvSpPr>
-        <p:spPr>
-          <a:xfrm>
-            <a:off x="7278899" y="4434103"/>
-            <a:ext cx="1126374" cy="153888"/>
-          </a:xfrm>
-          <a:prstGeom prst="rect">
-            <a:avLst/>
-          </a:prstGeom>
-          <a:noFill/>
-        </p:spPr>
-        <p:txBody>
-          <a:bodyPr wrap="square" lIns="0" tIns="0" rIns="0" bIns="0" rtlCol="0">
-            <a:spAutoFit/>
-          </a:bodyPr>
-          <a:lstStyle>
-            <a:defPPr>
-              <a:defRPr lang="en-US"/>
-            </a:defPPr>
-            <a:lvl1pPr algn="r">
-              <a:defRPr sz="1400">
-                <a:solidFill>
-                  <a:srgbClr val="0070C0"/>
-                </a:solidFill>
-              </a:defRPr>
-            </a:lvl1pPr>
-          </a:lstStyle>
-          <a:p>
-            <a:pPr algn="ctr"/>
-            <a:r>
-              <a:rPr lang="en-US" sz="1000" dirty="0" err="1">
-                <a:solidFill>
-                  <a:schemeClr val="accent4">
-                    <a:lumMod val="75000"/>
-                  </a:schemeClr>
-                </a:solidFill>
-              </a:rPr>
-              <a:t>updatedPatient</a:t>
-            </a:r>
-            <a:endParaRPr lang="en-US" sz="1000" dirty="0"/>
-          </a:p>
-        </p:txBody>
-      </p:sp>
-      <p:sp>
-        <p:nvSpPr>
-          <p:cNvPr id="111" name="Rectangle 110">
-            <a:extLst>
-              <a:ext uri="{FF2B5EF4-FFF2-40B4-BE49-F238E27FC236}">
-                <a16:creationId xmlns:a16="http://schemas.microsoft.com/office/drawing/2014/main" id="{BD973D4F-BD7B-4AF2-BC82-4B2E161DB5D8}"/>
-              </a:ext>
-            </a:extLst>
-          </p:cNvPr>
-          <p:cNvSpPr/>
-          <p:nvPr/>
-        </p:nvSpPr>
-        <p:spPr>
-          <a:xfrm>
-            <a:off x="8631776" y="4922469"/>
-            <a:ext cx="183730" cy="414435"/>
-          </a:xfrm>
-          <a:prstGeom prst="rect">
-            <a:avLst/>
-          </a:prstGeom>
-          <a:solidFill>
-            <a:srgbClr val="7030A0"/>
-          </a:solidFill>
-          <a:ln>
-            <a:solidFill>
-              <a:srgbClr val="7030A0"/>
-            </a:solidFill>
-          </a:ln>
-          <a:effectLst/>
-        </p:spPr>
-        <p:style>
-          <a:lnRef idx="1">
-            <a:schemeClr val="accent3"/>
-          </a:lnRef>
-          <a:fillRef idx="2">
-            <a:schemeClr val="accent3"/>
-          </a:fillRef>
-          <a:effectRef idx="1">
-            <a:schemeClr val="accent3"/>
-          </a:effectRef>
-          <a:fontRef idx="minor">
-            <a:schemeClr val="dk1"/>
-          </a:fontRef>
-        </p:style>
-        <p:txBody>
-          <a:bodyPr rtlCol="0" anchor="ctr"/>
-          <a:lstStyle/>
-          <a:p>
-            <a:pPr algn="ctr"/>
-            <a:endParaRPr lang="en-SG" sz="1400"/>
-          </a:p>
-        </p:txBody>
-      </p:sp>
-      <p:cxnSp>
-        <p:nvCxnSpPr>
           <p:cNvPr id="112" name="Straight Arrow Connector 111">
             <a:extLst>
               <a:ext uri="{FF2B5EF4-FFF2-40B4-BE49-F238E27FC236}">
@@ -5876,8 +5674,8 @@
         </p:nvCxnSpPr>
         <p:spPr>
           <a:xfrm flipV="1">
-            <a:off x="7223406" y="4933268"/>
-            <a:ext cx="1447218" cy="4890"/>
+            <a:off x="7225005" y="5073983"/>
+            <a:ext cx="2487937" cy="1"/>
           </a:xfrm>
           <a:prstGeom prst="straightConnector1">
             <a:avLst/>
@@ -5918,7 +5716,7 @@
         </p:nvSpPr>
         <p:spPr>
           <a:xfrm>
-            <a:off x="7169472" y="4718125"/>
+            <a:off x="8332275" y="4845948"/>
             <a:ext cx="1474852" cy="184666"/>
           </a:xfrm>
           <a:prstGeom prst="rect">
@@ -5982,7 +5780,7 @@
         </p:nvSpPr>
         <p:spPr>
           <a:xfrm>
-            <a:off x="8880168" y="4794339"/>
+            <a:off x="9958445" y="4928116"/>
             <a:ext cx="1474852" cy="184666"/>
           </a:xfrm>
           <a:prstGeom prst="rect">
@@ -6048,7 +5846,7 @@
         </p:nvCxnSpPr>
         <p:spPr>
           <a:xfrm>
-            <a:off x="8786792" y="5247368"/>
+            <a:off x="9865069" y="5381145"/>
             <a:ext cx="1668063" cy="10430"/>
           </a:xfrm>
           <a:prstGeom prst="straightConnector1">
@@ -6089,14 +5887,13 @@
           </p:cNvPr>
           <p:cNvCxnSpPr>
             <a:cxnSpLocks/>
-            <a:endCxn id="111" idx="2"/>
           </p:cNvCxnSpPr>
           <p:nvPr/>
         </p:nvCxnSpPr>
         <p:spPr>
           <a:xfrm>
-            <a:off x="7209406" y="5326474"/>
-            <a:ext cx="1514235" cy="10430"/>
+            <a:off x="7211693" y="5470681"/>
+            <a:ext cx="2580071" cy="0"/>
           </a:xfrm>
           <a:prstGeom prst="straightConnector1">
             <a:avLst/>
@@ -6127,10 +5924,76 @@
       </p:cxnSp>
       <p:sp>
         <p:nvSpPr>
-          <p:cNvPr id="60" name="Rectangle 59">
+          <p:cNvPr id="60" name="TextBox 59">
             <a:extLst>
               <a:ext uri="{FF2B5EF4-FFF2-40B4-BE49-F238E27FC236}">
-                <a16:creationId xmlns:a16="http://schemas.microsoft.com/office/drawing/2014/main" id="{9694B1EA-CF88-4A86-A9E7-E0908BA56634}"/>
+                <a16:creationId xmlns:a16="http://schemas.microsoft.com/office/drawing/2014/main" id="{31733E01-D84F-4699-9435-C1F509AF44CE}"/>
+              </a:ext>
+            </a:extLst>
+          </p:cNvPr>
+          <p:cNvSpPr txBox="1"/>
+          <p:nvPr/>
+        </p:nvSpPr>
+        <p:spPr>
+          <a:xfrm>
+            <a:off x="7146472" y="2926468"/>
+            <a:ext cx="1365410" cy="461665"/>
+          </a:xfrm>
+          <a:prstGeom prst="rect">
+            <a:avLst/>
+          </a:prstGeom>
+          <a:noFill/>
+        </p:spPr>
+        <p:txBody>
+          <a:bodyPr wrap="square" lIns="0" tIns="0" rIns="0" bIns="0" rtlCol="0">
+            <a:spAutoFit/>
+          </a:bodyPr>
+          <a:lstStyle>
+            <a:defPPr>
+              <a:defRPr lang="en-US"/>
+            </a:defPPr>
+            <a:lvl1pPr algn="r">
+              <a:defRPr sz="1400">
+                <a:solidFill>
+                  <a:srgbClr val="0070C0"/>
+                </a:solidFill>
+              </a:defRPr>
+            </a:lvl1pPr>
+          </a:lstStyle>
+          <a:p>
+            <a:pPr algn="ctr"/>
+            <a:r>
+              <a:rPr lang="en-US" sz="1000" dirty="0"/>
+              <a:t>&lt;&lt;static&gt;&gt;</a:t>
+            </a:r>
+          </a:p>
+          <a:p>
+            <a:pPr algn="ctr"/>
+            <a:r>
+              <a:rPr lang="en-US" sz="1000" dirty="0" err="1"/>
+              <a:t>getPatient</a:t>
+            </a:r>
+            <a:r>
+              <a:rPr lang="en-US" sz="1000" dirty="0"/>
+              <a:t>(</a:t>
+            </a:r>
+            <a:r>
+              <a:rPr lang="en-US" sz="1000" dirty="0" err="1"/>
+              <a:t>patientNric</a:t>
+            </a:r>
+            <a:r>
+              <a:rPr lang="en-US" sz="1000" dirty="0"/>
+              <a:t>, model)</a:t>
+            </a:r>
+          </a:p>
+        </p:txBody>
+      </p:sp>
+      <p:sp>
+        <p:nvSpPr>
+          <p:cNvPr id="62" name="Rectangle 61">
+            <a:extLst>
+              <a:ext uri="{FF2B5EF4-FFF2-40B4-BE49-F238E27FC236}">
+                <a16:creationId xmlns:a16="http://schemas.microsoft.com/office/drawing/2014/main" id="{3FA97741-3A79-4033-B44E-31072F1635D8}"/>
               </a:ext>
             </a:extLst>
           </p:cNvPr>
@@ -6139,7 +6002,7 @@
         </p:nvSpPr>
         <p:spPr>
           <a:xfrm>
-            <a:off x="7160246" y="3598626"/>
+            <a:off x="7162800" y="4387335"/>
             <a:ext cx="183653" cy="184665"/>
           </a:xfrm>
           <a:prstGeom prst="rect">
@@ -6180,10 +6043,10 @@
       </p:sp>
       <p:cxnSp>
         <p:nvCxnSpPr>
-          <p:cNvPr id="62" name="Curved Connector 12">
+          <p:cNvPr id="68" name="Curved Connector 12">
             <a:extLst>
               <a:ext uri="{FF2B5EF4-FFF2-40B4-BE49-F238E27FC236}">
-                <a16:creationId xmlns:a16="http://schemas.microsoft.com/office/drawing/2014/main" id="{38A7DDB3-33B2-45A3-AAC8-33DD6EC4CD19}"/>
+                <a16:creationId xmlns:a16="http://schemas.microsoft.com/office/drawing/2014/main" id="{EBD727D7-B718-495F-B63A-2E1720EFF233}"/>
               </a:ext>
             </a:extLst>
           </p:cNvPr>
@@ -6194,18 +6057,18 @@
         </p:nvCxnSpPr>
         <p:spPr>
           <a:xfrm rot="16200000" flipH="1">
-            <a:off x="7199292" y="3503091"/>
+            <a:off x="7198638" y="4303038"/>
             <a:ext cx="156923" cy="76200"/>
           </a:xfrm>
           <a:prstGeom prst="curvedConnector4">
             <a:avLst>
               <a:gd name="adj1" fmla="val -32706"/>
-              <a:gd name="adj2" fmla="val 289797"/>
+              <a:gd name="adj2" fmla="val 338776"/>
             </a:avLst>
           </a:prstGeom>
           <a:ln>
             <a:solidFill>
-              <a:srgbClr val="7030A0"/>
+              <a:srgbClr val="0070C0"/>
             </a:solidFill>
             <a:tailEnd type="triangle"/>
           </a:ln>
@@ -6227,10 +6090,10 @@
       </p:cxnSp>
       <p:cxnSp>
         <p:nvCxnSpPr>
-          <p:cNvPr id="68" name="Connector: Curved 67">
+          <p:cNvPr id="70" name="Connector: Curved 69">
             <a:extLst>
               <a:ext uri="{FF2B5EF4-FFF2-40B4-BE49-F238E27FC236}">
-                <a16:creationId xmlns:a16="http://schemas.microsoft.com/office/drawing/2014/main" id="{8395EFBD-B8DC-4C11-A85D-EEEE58EB2FC3}"/>
+                <a16:creationId xmlns:a16="http://schemas.microsoft.com/office/drawing/2014/main" id="{4EC47D19-6C8E-4397-A6D6-2D4A93A66145}"/>
               </a:ext>
             </a:extLst>
           </p:cNvPr>
@@ -6241,7 +6104,7 @@
         </p:nvCxnSpPr>
         <p:spPr>
           <a:xfrm flipH="1">
-            <a:off x="7226227" y="3710534"/>
+            <a:off x="7239000" y="4495800"/>
             <a:ext cx="131954" cy="199987"/>
           </a:xfrm>
           <a:prstGeom prst="curvedConnector4">
@@ -6252,7 +6115,7 @@
           </a:prstGeom>
           <a:ln w="9525" cap="flat" cmpd="sng" algn="ctr">
             <a:solidFill>
-              <a:schemeClr val="dk1"/>
+              <a:schemeClr val="accent1"/>
             </a:solidFill>
             <a:prstDash val="dash"/>
             <a:round/>
@@ -6277,10 +6140,10 @@
       </p:cxnSp>
       <p:sp>
         <p:nvSpPr>
-          <p:cNvPr id="70" name="TextBox 69">
+          <p:cNvPr id="71" name="TextBox 70">
             <a:extLst>
               <a:ext uri="{FF2B5EF4-FFF2-40B4-BE49-F238E27FC236}">
-                <a16:creationId xmlns:a16="http://schemas.microsoft.com/office/drawing/2014/main" id="{C0E8AADE-D5D3-4C7C-9F6E-11C93207DDC3}"/>
+                <a16:creationId xmlns:a16="http://schemas.microsoft.com/office/drawing/2014/main" id="{61EA3570-9798-432B-9358-864C07633665}"/>
               </a:ext>
             </a:extLst>
           </p:cNvPr>
@@ -6289,8 +6152,8 @@
         </p:nvSpPr>
         <p:spPr>
           <a:xfrm>
-            <a:off x="7211948" y="3275112"/>
-            <a:ext cx="1474852" cy="153888"/>
+            <a:off x="7365439" y="4056189"/>
+            <a:ext cx="1136290" cy="415498"/>
           </a:xfrm>
           <a:prstGeom prst="rect">
             <a:avLst/>
@@ -6316,35 +6179,45 @@
           <a:p>
             <a:pPr algn="ctr"/>
             <a:r>
-              <a:rPr lang="en-US" sz="1000" dirty="0" err="1">
-                <a:solidFill>
-                  <a:schemeClr val="accent4">
-                    <a:lumMod val="75000"/>
-                  </a:schemeClr>
-                </a:solidFill>
-              </a:rPr>
-              <a:t>getPatientByPatientNric</a:t>
-            </a:r>
-            <a:r>
-              <a:rPr lang="en-US" sz="1000" dirty="0">
-                <a:solidFill>
-                  <a:schemeClr val="accent4">
-                    <a:lumMod val="75000"/>
-                  </a:schemeClr>
-                </a:solidFill>
-              </a:rPr>
-              <a:t>(…)</a:t>
-            </a:r>
-            <a:endParaRPr lang="en-US" sz="1000" dirty="0"/>
-          </a:p>
-        </p:txBody>
-      </p:sp>
-      <p:sp>
-        <p:nvSpPr>
-          <p:cNvPr id="71" name="TextBox 70">
+              <a:rPr lang="en-US" sz="900" dirty="0" err="1"/>
+              <a:t>addDietsForPatient</a:t>
+            </a:r>
+            <a:endParaRPr lang="en-US" sz="900" dirty="0"/>
+          </a:p>
+          <a:p>
+            <a:pPr algn="ctr"/>
+            <a:r>
+              <a:rPr lang="en-US" sz="900" dirty="0"/>
+              <a:t>(</a:t>
+            </a:r>
+            <a:r>
+              <a:rPr lang="en-US" sz="900" dirty="0" err="1"/>
+              <a:t>patientToUpdate</a:t>
+            </a:r>
+            <a:r>
+              <a:rPr lang="en-US" sz="900" dirty="0"/>
+              <a:t>, </a:t>
+            </a:r>
+          </a:p>
+          <a:p>
+            <a:pPr algn="ctr"/>
+            <a:r>
+              <a:rPr lang="en-US" sz="900" dirty="0" err="1"/>
+              <a:t>dietsToAdd</a:t>
+            </a:r>
+            <a:r>
+              <a:rPr lang="en-US" sz="900" dirty="0"/>
+              <a:t>)</a:t>
+            </a:r>
+          </a:p>
+        </p:txBody>
+      </p:sp>
+      <p:sp>
+        <p:nvSpPr>
+          <p:cNvPr id="72" name="TextBox 71">
             <a:extLst>
               <a:ext uri="{FF2B5EF4-FFF2-40B4-BE49-F238E27FC236}">
-                <a16:creationId xmlns:a16="http://schemas.microsoft.com/office/drawing/2014/main" id="{D4C33435-7FE7-4E09-99CC-C62A2783814F}"/>
+                <a16:creationId xmlns:a16="http://schemas.microsoft.com/office/drawing/2014/main" id="{12FBEB08-FD2E-4A8C-9721-8D7EEC6B6371}"/>
               </a:ext>
             </a:extLst>
           </p:cNvPr>
@@ -6353,8 +6226,8 @@
         </p:nvSpPr>
         <p:spPr>
           <a:xfrm>
-            <a:off x="7010400" y="5732225"/>
-            <a:ext cx="258404" cy="261610"/>
+            <a:off x="7176372" y="4531579"/>
+            <a:ext cx="1365410" cy="153888"/>
           </a:xfrm>
           <a:prstGeom prst="rect">
             <a:avLst/>
@@ -6362,28 +6235,37 @@
           <a:noFill/>
         </p:spPr>
         <p:txBody>
-          <a:bodyPr wrap="none" rtlCol="0">
+          <a:bodyPr wrap="square" lIns="0" tIns="0" rIns="0" bIns="0" rtlCol="0">
             <a:spAutoFit/>
           </a:bodyPr>
-          <a:lstStyle/>
-          <a:p>
-            <a:r>
-              <a:rPr lang="en-SG" sz="1100" dirty="0">
-                <a:solidFill>
-                  <a:srgbClr val="002060"/>
-                </a:solidFill>
-              </a:rPr>
-              <a:t>X</a:t>
-            </a:r>
-          </a:p>
-        </p:txBody>
-      </p:sp>
-      <p:sp>
-        <p:nvSpPr>
-          <p:cNvPr id="74" name="TextBox 73">
+          <a:lstStyle>
+            <a:defPPr>
+              <a:defRPr lang="en-US"/>
+            </a:defPPr>
+            <a:lvl1pPr algn="r">
+              <a:defRPr sz="1400">
+                <a:solidFill>
+                  <a:srgbClr val="0070C0"/>
+                </a:solidFill>
+              </a:defRPr>
+            </a:lvl1pPr>
+          </a:lstStyle>
+          <a:p>
+            <a:pPr algn="ctr"/>
+            <a:r>
+              <a:rPr lang="en-US" sz="1000" dirty="0" err="1"/>
+              <a:t>updatedPatient</a:t>
+            </a:r>
+            <a:endParaRPr lang="en-US" sz="1000" dirty="0"/>
+          </a:p>
+        </p:txBody>
+      </p:sp>
+      <p:sp>
+        <p:nvSpPr>
+          <p:cNvPr id="73" name="TextBox 72">
             <a:extLst>
               <a:ext uri="{FF2B5EF4-FFF2-40B4-BE49-F238E27FC236}">
-                <a16:creationId xmlns:a16="http://schemas.microsoft.com/office/drawing/2014/main" id="{D70C2ACD-E3FC-47F4-9C31-5A6BAA0E0806}"/>
+                <a16:creationId xmlns:a16="http://schemas.microsoft.com/office/drawing/2014/main" id="{B60F36D2-F621-4ABD-A6EF-150F377DDCF5}"/>
               </a:ext>
             </a:extLst>
           </p:cNvPr>
@@ -6392,7 +6274,7 @@
         </p:nvSpPr>
         <p:spPr>
           <a:xfrm>
-            <a:off x="5436380" y="2910957"/>
+            <a:off x="5403682" y="2886661"/>
             <a:ext cx="258404" cy="261610"/>
           </a:xfrm>
           <a:prstGeom prst="rect">
@@ -6419,10 +6301,49 @@
       </p:sp>
       <p:sp>
         <p:nvSpPr>
-          <p:cNvPr id="72" name="Rectangle 71">
+          <p:cNvPr id="74" name="TextBox 73">
             <a:extLst>
               <a:ext uri="{FF2B5EF4-FFF2-40B4-BE49-F238E27FC236}">
-                <a16:creationId xmlns:a16="http://schemas.microsoft.com/office/drawing/2014/main" id="{C3D4CF51-AC72-465A-B8B3-4B322A4A9219}"/>
+                <a16:creationId xmlns:a16="http://schemas.microsoft.com/office/drawing/2014/main" id="{849B3AE7-7306-469E-B739-EF2F69E67171}"/>
+              </a:ext>
+            </a:extLst>
+          </p:cNvPr>
+          <p:cNvSpPr txBox="1"/>
+          <p:nvPr/>
+        </p:nvSpPr>
+        <p:spPr>
+          <a:xfrm>
+            <a:off x="6996222" y="5718812"/>
+            <a:ext cx="258404" cy="261610"/>
+          </a:xfrm>
+          <a:prstGeom prst="rect">
+            <a:avLst/>
+          </a:prstGeom>
+          <a:noFill/>
+        </p:spPr>
+        <p:txBody>
+          <a:bodyPr wrap="none" rtlCol="0">
+            <a:spAutoFit/>
+          </a:bodyPr>
+          <a:lstStyle/>
+          <a:p>
+            <a:r>
+              <a:rPr lang="en-SG" sz="1100" dirty="0">
+                <a:solidFill>
+                  <a:srgbClr val="002060"/>
+                </a:solidFill>
+              </a:rPr>
+              <a:t>X</a:t>
+            </a:r>
+          </a:p>
+        </p:txBody>
+      </p:sp>
+      <p:sp>
+        <p:nvSpPr>
+          <p:cNvPr id="63" name="Rectangle 62">
+            <a:extLst>
+              <a:ext uri="{FF2B5EF4-FFF2-40B4-BE49-F238E27FC236}">
+                <a16:creationId xmlns:a16="http://schemas.microsoft.com/office/drawing/2014/main" id="{A7BF1B9D-FF3B-46DA-AB76-6ABB695A7B70}"/>
               </a:ext>
             </a:extLst>
           </p:cNvPr>
@@ -6431,8 +6352,8 @@
         </p:nvSpPr>
         <p:spPr>
           <a:xfrm>
-            <a:off x="5456801" y="1603561"/>
-            <a:ext cx="180691" cy="120333"/>
+            <a:off x="5457427" y="1922192"/>
+            <a:ext cx="162711" cy="752559"/>
           </a:xfrm>
           <a:prstGeom prst="rect">
             <a:avLst/>
@@ -6470,33 +6391,253 @@
           </a:p>
         </p:txBody>
       </p:sp>
-      <p:cxnSp>
-        <p:nvCxnSpPr>
-          <p:cNvPr id="9" name="Straight Arrow Connector 8">
+      <p:sp>
+        <p:nvSpPr>
+          <p:cNvPr id="75" name="Rectangle 62">
             <a:extLst>
               <a:ext uri="{FF2B5EF4-FFF2-40B4-BE49-F238E27FC236}">
-                <a16:creationId xmlns:a16="http://schemas.microsoft.com/office/drawing/2014/main" id="{D5F4B502-C6A5-4160-B399-74C770EB2702}"/>
+                <a16:creationId xmlns:a16="http://schemas.microsoft.com/office/drawing/2014/main" id="{EEA6CC37-1417-480E-A232-757D68F83E91}"/>
               </a:ext>
             </a:extLst>
           </p:cNvPr>
-          <p:cNvCxnSpPr/>
+          <p:cNvSpPr/>
+          <p:nvPr/>
+        </p:nvSpPr>
+        <p:spPr>
+          <a:xfrm>
+            <a:off x="7879689" y="1293145"/>
+            <a:ext cx="1127409" cy="782135"/>
+          </a:xfrm>
+          <a:prstGeom prst="rect">
+            <a:avLst/>
+          </a:prstGeom>
+          <a:solidFill>
+            <a:srgbClr val="0070C0"/>
+          </a:solidFill>
+          <a:ln w="19050">
+            <a:solidFill>
+              <a:srgbClr val="0070C0"/>
+            </a:solidFill>
+          </a:ln>
+          <a:effectLst/>
+        </p:spPr>
+        <p:style>
+          <a:lnRef idx="1">
+            <a:schemeClr val="accent2"/>
+          </a:lnRef>
+          <a:fillRef idx="2">
+            <a:schemeClr val="accent2"/>
+          </a:fillRef>
+          <a:effectRef idx="1">
+            <a:schemeClr val="accent2"/>
+          </a:effectRef>
+          <a:fontRef idx="minor">
+            <a:schemeClr val="dk1"/>
+          </a:fontRef>
+        </p:style>
+        <p:txBody>
+          <a:bodyPr rtlCol="0" anchor="ctr"/>
+          <a:lstStyle/>
+          <a:p>
+            <a:pPr algn="ctr"/>
+            <a:r>
+              <a:rPr lang="en-US" sz="1600" dirty="0">
+                <a:solidFill>
+                  <a:schemeClr val="bg1"/>
+                </a:solidFill>
+              </a:rPr>
+              <a:t>&lt;&lt;class&gt;&gt;</a:t>
+            </a:r>
+          </a:p>
+          <a:p>
+            <a:pPr algn="ctr"/>
+            <a:r>
+              <a:rPr lang="en-US" sz="1600" dirty="0" err="1">
+                <a:solidFill>
+                  <a:schemeClr val="bg1"/>
+                </a:solidFill>
+              </a:rPr>
+              <a:t>CommandUtil</a:t>
+            </a:r>
+            <a:endParaRPr lang="en-SG" sz="1600" dirty="0">
+              <a:solidFill>
+                <a:schemeClr val="bg1"/>
+              </a:solidFill>
+            </a:endParaRPr>
+          </a:p>
+        </p:txBody>
+      </p:sp>
+      <p:cxnSp>
+        <p:nvCxnSpPr>
+          <p:cNvPr id="76" name="Straight Connector 75">
+            <a:extLst>
+              <a:ext uri="{FF2B5EF4-FFF2-40B4-BE49-F238E27FC236}">
+                <a16:creationId xmlns:a16="http://schemas.microsoft.com/office/drawing/2014/main" id="{EC2C262C-5689-4988-99B5-08373A951BBC}"/>
+              </a:ext>
+            </a:extLst>
+          </p:cNvPr>
+          <p:cNvCxnSpPr>
+            <a:cxnSpLocks/>
+          </p:cNvCxnSpPr>
           <p:nvPr/>
         </p:nvCxnSpPr>
         <p:spPr>
-          <a:xfrm flipH="1">
-            <a:off x="7221847" y="3910521"/>
-            <a:ext cx="57052" cy="0"/>
+          <a:xfrm>
+            <a:off x="8465327" y="2048041"/>
+            <a:ext cx="0" cy="3705446"/>
+          </a:xfrm>
+          <a:prstGeom prst="line">
+            <a:avLst/>
+          </a:prstGeom>
+          <a:ln w="19050">
+            <a:solidFill>
+              <a:srgbClr val="0070C0"/>
+            </a:solidFill>
+            <a:prstDash val="sysDash"/>
+          </a:ln>
+          <a:effectLst/>
+        </p:spPr>
+        <p:style>
+          <a:lnRef idx="1">
+            <a:schemeClr val="accent1"/>
+          </a:lnRef>
+          <a:fillRef idx="2">
+            <a:schemeClr val="accent1"/>
+          </a:fillRef>
+          <a:effectRef idx="1">
+            <a:schemeClr val="accent1"/>
+          </a:effectRef>
+          <a:fontRef idx="minor">
+            <a:schemeClr val="dk1"/>
+          </a:fontRef>
+        </p:style>
+      </p:cxnSp>
+      <p:cxnSp>
+        <p:nvCxnSpPr>
+          <p:cNvPr id="77" name="Straight Arrow Connector 76">
+            <a:extLst>
+              <a:ext uri="{FF2B5EF4-FFF2-40B4-BE49-F238E27FC236}">
+                <a16:creationId xmlns:a16="http://schemas.microsoft.com/office/drawing/2014/main" id="{682DC225-3011-4885-B404-9F0637BEF62A}"/>
+              </a:ext>
+            </a:extLst>
+          </p:cNvPr>
+          <p:cNvCxnSpPr>
+            <a:cxnSpLocks/>
+          </p:cNvCxnSpPr>
+          <p:nvPr/>
+        </p:nvCxnSpPr>
+        <p:spPr>
+          <a:xfrm>
+            <a:off x="7146472" y="3418858"/>
+            <a:ext cx="1212801" cy="0"/>
           </a:xfrm>
           <a:prstGeom prst="straightConnector1">
             <a:avLst/>
           </a:prstGeom>
+          <a:ln w="19050">
+            <a:solidFill>
+              <a:srgbClr val="0070C0"/>
+            </a:solidFill>
+            <a:tailEnd type="arrow"/>
+          </a:ln>
+        </p:spPr>
+        <p:style>
+          <a:lnRef idx="1">
+            <a:schemeClr val="accent1"/>
+          </a:lnRef>
+          <a:fillRef idx="0">
+            <a:schemeClr val="accent1"/>
+          </a:fillRef>
+          <a:effectRef idx="0">
+            <a:schemeClr val="accent1"/>
+          </a:effectRef>
+          <a:fontRef idx="minor">
+            <a:schemeClr val="tx1"/>
+          </a:fontRef>
+        </p:style>
+      </p:cxnSp>
+      <p:sp>
+        <p:nvSpPr>
+          <p:cNvPr id="79" name="Rectangle 78">
+            <a:extLst>
+              <a:ext uri="{FF2B5EF4-FFF2-40B4-BE49-F238E27FC236}">
+                <a16:creationId xmlns:a16="http://schemas.microsoft.com/office/drawing/2014/main" id="{09444FB0-09D2-432E-9E51-5E0C0F872507}"/>
+              </a:ext>
+            </a:extLst>
+          </p:cNvPr>
+          <p:cNvSpPr/>
+          <p:nvPr/>
+        </p:nvSpPr>
+        <p:spPr>
+          <a:xfrm>
+            <a:off x="8364152" y="3407647"/>
+            <a:ext cx="175296" cy="615173"/>
+          </a:xfrm>
+          <a:prstGeom prst="rect">
+            <a:avLst/>
+          </a:prstGeom>
+          <a:solidFill>
+            <a:srgbClr val="0070C0"/>
+          </a:solidFill>
           <a:ln>
             <a:solidFill>
-              <a:schemeClr val="accent1">
-                <a:lumMod val="75000"/>
-              </a:schemeClr>
+              <a:srgbClr val="0070C0"/>
             </a:solidFill>
-            <a:tailEnd type="triangle"/>
+          </a:ln>
+          <a:effectLst/>
+        </p:spPr>
+        <p:style>
+          <a:lnRef idx="1">
+            <a:schemeClr val="accent3"/>
+          </a:lnRef>
+          <a:fillRef idx="2">
+            <a:schemeClr val="accent3"/>
+          </a:fillRef>
+          <a:effectRef idx="1">
+            <a:schemeClr val="accent3"/>
+          </a:effectRef>
+          <a:fontRef idx="minor">
+            <a:schemeClr val="dk1"/>
+          </a:fontRef>
+        </p:style>
+        <p:txBody>
+          <a:bodyPr rtlCol="0" anchor="ctr"/>
+          <a:lstStyle/>
+          <a:p>
+            <a:pPr algn="ctr"/>
+            <a:endParaRPr lang="en-SG" sz="1400"/>
+          </a:p>
+        </p:txBody>
+      </p:sp>
+      <p:cxnSp>
+        <p:nvCxnSpPr>
+          <p:cNvPr id="85" name="Straight Arrow Connector 84">
+            <a:extLst>
+              <a:ext uri="{FF2B5EF4-FFF2-40B4-BE49-F238E27FC236}">
+                <a16:creationId xmlns:a16="http://schemas.microsoft.com/office/drawing/2014/main" id="{21ED7CDC-0080-456F-9A0C-58321D8F0F66}"/>
+              </a:ext>
+            </a:extLst>
+          </p:cNvPr>
+          <p:cNvCxnSpPr>
+            <a:cxnSpLocks/>
+          </p:cNvCxnSpPr>
+          <p:nvPr/>
+        </p:nvCxnSpPr>
+        <p:spPr>
+          <a:xfrm flipV="1">
+            <a:off x="7221276" y="4004587"/>
+            <a:ext cx="1173989" cy="4361"/>
+          </a:xfrm>
+          <a:prstGeom prst="straightConnector1">
+            <a:avLst/>
+          </a:prstGeom>
+          <a:ln w="19050">
+            <a:solidFill>
+              <a:srgbClr val="0070C0"/>
+            </a:solidFill>
+            <a:prstDash val="sysDash"/>
+            <a:headEnd type="arrow" w="med" len="med"/>
+            <a:tailEnd type="none" w="med" len="med"/>
           </a:ln>
         </p:spPr>
         <p:style>
@@ -6516,31 +6657,33 @@
       </p:cxnSp>
       <p:cxnSp>
         <p:nvCxnSpPr>
-          <p:cNvPr id="11" name="Straight Arrow Connector 10">
+          <p:cNvPr id="87" name="Straight Arrow Connector 86">
             <a:extLst>
               <a:ext uri="{FF2B5EF4-FFF2-40B4-BE49-F238E27FC236}">
-                <a16:creationId xmlns:a16="http://schemas.microsoft.com/office/drawing/2014/main" id="{58962282-B2CB-4584-BB30-9014B61069A4}"/>
+                <a16:creationId xmlns:a16="http://schemas.microsoft.com/office/drawing/2014/main" id="{B0921A5A-C978-4CC9-860E-1CA1F623655B}"/>
               </a:ext>
             </a:extLst>
           </p:cNvPr>
-          <p:cNvCxnSpPr/>
+          <p:cNvCxnSpPr>
+            <a:cxnSpLocks/>
+          </p:cNvCxnSpPr>
           <p:nvPr/>
         </p:nvCxnSpPr>
         <p:spPr>
-          <a:xfrm flipH="1">
-            <a:off x="7207554" y="4635983"/>
-            <a:ext cx="71345" cy="0"/>
+          <a:xfrm flipV="1">
+            <a:off x="7189947" y="4701652"/>
+            <a:ext cx="126359" cy="1"/>
           </a:xfrm>
           <a:prstGeom prst="straightConnector1">
             <a:avLst/>
           </a:prstGeom>
-          <a:ln>
+          <a:ln w="19050">
             <a:solidFill>
-              <a:schemeClr val="accent1">
-                <a:lumMod val="75000"/>
-              </a:schemeClr>
+              <a:srgbClr val="0070C0"/>
             </a:solidFill>
-            <a:tailEnd type="triangle"/>
+            <a:prstDash val="sysDash"/>
+            <a:headEnd type="arrow" w="med" len="med"/>
+            <a:tailEnd type="none" w="med" len="med"/>
           </a:ln>
         </p:spPr>
         <p:style>
@@ -6558,6 +6701,528 @@
           </a:fontRef>
         </p:style>
       </p:cxnSp>
+      <p:sp>
+        <p:nvSpPr>
+          <p:cNvPr id="78" name="Rectangle 77">
+            <a:extLst>
+              <a:ext uri="{FF2B5EF4-FFF2-40B4-BE49-F238E27FC236}">
+                <a16:creationId xmlns:a16="http://schemas.microsoft.com/office/drawing/2014/main" id="{A8505981-E883-44DC-88AF-63833F33D220}"/>
+              </a:ext>
+            </a:extLst>
+          </p:cNvPr>
+          <p:cNvSpPr/>
+          <p:nvPr/>
+        </p:nvSpPr>
+        <p:spPr>
+          <a:xfrm>
+            <a:off x="9732176" y="3469008"/>
+            <a:ext cx="132893" cy="184662"/>
+          </a:xfrm>
+          <a:prstGeom prst="rect">
+            <a:avLst/>
+          </a:prstGeom>
+          <a:solidFill>
+            <a:srgbClr val="7030A0"/>
+          </a:solidFill>
+          <a:ln>
+            <a:solidFill>
+              <a:srgbClr val="7030A0"/>
+            </a:solidFill>
+          </a:ln>
+          <a:effectLst/>
+        </p:spPr>
+        <p:style>
+          <a:lnRef idx="1">
+            <a:schemeClr val="accent3"/>
+          </a:lnRef>
+          <a:fillRef idx="2">
+            <a:schemeClr val="accent3"/>
+          </a:fillRef>
+          <a:effectRef idx="1">
+            <a:schemeClr val="accent3"/>
+          </a:effectRef>
+          <a:fontRef idx="minor">
+            <a:schemeClr val="dk1"/>
+          </a:fontRef>
+        </p:style>
+        <p:txBody>
+          <a:bodyPr rtlCol="0" anchor="ctr"/>
+          <a:lstStyle/>
+          <a:p>
+            <a:pPr algn="ctr"/>
+            <a:endParaRPr lang="en-SG" sz="1400"/>
+          </a:p>
+        </p:txBody>
+      </p:sp>
+      <p:cxnSp>
+        <p:nvCxnSpPr>
+          <p:cNvPr id="88" name="Straight Arrow Connector 87">
+            <a:extLst>
+              <a:ext uri="{FF2B5EF4-FFF2-40B4-BE49-F238E27FC236}">
+                <a16:creationId xmlns:a16="http://schemas.microsoft.com/office/drawing/2014/main" id="{AEAD58B2-985A-4D96-BCFE-3DFF932FD81F}"/>
+              </a:ext>
+            </a:extLst>
+          </p:cNvPr>
+          <p:cNvCxnSpPr>
+            <a:cxnSpLocks/>
+          </p:cNvCxnSpPr>
+          <p:nvPr/>
+        </p:nvCxnSpPr>
+        <p:spPr>
+          <a:xfrm flipV="1">
+            <a:off x="8340721" y="3481267"/>
+            <a:ext cx="1423065" cy="2469"/>
+          </a:xfrm>
+          <a:prstGeom prst="straightConnector1">
+            <a:avLst/>
+          </a:prstGeom>
+          <a:ln w="19050">
+            <a:solidFill>
+              <a:srgbClr val="0070C0"/>
+            </a:solidFill>
+            <a:tailEnd type="arrow"/>
+          </a:ln>
+        </p:spPr>
+        <p:style>
+          <a:lnRef idx="1">
+            <a:schemeClr val="accent1"/>
+          </a:lnRef>
+          <a:fillRef idx="0">
+            <a:schemeClr val="accent1"/>
+          </a:fillRef>
+          <a:effectRef idx="0">
+            <a:schemeClr val="accent1"/>
+          </a:effectRef>
+          <a:fontRef idx="minor">
+            <a:schemeClr val="tx1"/>
+          </a:fontRef>
+        </p:style>
+      </p:cxnSp>
+      <p:cxnSp>
+        <p:nvCxnSpPr>
+          <p:cNvPr id="90" name="Straight Arrow Connector 89">
+            <a:extLst>
+              <a:ext uri="{FF2B5EF4-FFF2-40B4-BE49-F238E27FC236}">
+                <a16:creationId xmlns:a16="http://schemas.microsoft.com/office/drawing/2014/main" id="{C0EA5FBA-4D22-4BE8-AC9F-DF3D3DF95518}"/>
+              </a:ext>
+            </a:extLst>
+          </p:cNvPr>
+          <p:cNvCxnSpPr>
+            <a:cxnSpLocks/>
+          </p:cNvCxnSpPr>
+          <p:nvPr/>
+        </p:nvCxnSpPr>
+        <p:spPr>
+          <a:xfrm>
+            <a:off x="8539448" y="3653670"/>
+            <a:ext cx="1169231" cy="0"/>
+          </a:xfrm>
+          <a:prstGeom prst="straightConnector1">
+            <a:avLst/>
+          </a:prstGeom>
+          <a:ln w="19050">
+            <a:solidFill>
+              <a:srgbClr val="7030A0"/>
+            </a:solidFill>
+            <a:prstDash val="sysDash"/>
+            <a:headEnd type="arrow" w="med" len="med"/>
+            <a:tailEnd type="none" w="med" len="med"/>
+          </a:ln>
+        </p:spPr>
+        <p:style>
+          <a:lnRef idx="1">
+            <a:schemeClr val="accent1"/>
+          </a:lnRef>
+          <a:fillRef idx="0">
+            <a:schemeClr val="accent1"/>
+          </a:fillRef>
+          <a:effectRef idx="0">
+            <a:schemeClr val="accent1"/>
+          </a:effectRef>
+          <a:fontRef idx="minor">
+            <a:schemeClr val="tx1"/>
+          </a:fontRef>
+        </p:style>
+      </p:cxnSp>
+      <p:sp>
+        <p:nvSpPr>
+          <p:cNvPr id="91" name="TextBox 90">
+            <a:extLst>
+              <a:ext uri="{FF2B5EF4-FFF2-40B4-BE49-F238E27FC236}">
+                <a16:creationId xmlns:a16="http://schemas.microsoft.com/office/drawing/2014/main" id="{5F9F510F-416D-4D57-844E-5D1DD17A4F6F}"/>
+              </a:ext>
+            </a:extLst>
+          </p:cNvPr>
+          <p:cNvSpPr txBox="1"/>
+          <p:nvPr/>
+        </p:nvSpPr>
+        <p:spPr>
+          <a:xfrm>
+            <a:off x="8682020" y="3167085"/>
+            <a:ext cx="957316" cy="276999"/>
+          </a:xfrm>
+          <a:prstGeom prst="rect">
+            <a:avLst/>
+          </a:prstGeom>
+          <a:noFill/>
+        </p:spPr>
+        <p:txBody>
+          <a:bodyPr wrap="square" lIns="0" tIns="0" rIns="0" bIns="0" rtlCol="0">
+            <a:spAutoFit/>
+          </a:bodyPr>
+          <a:lstStyle>
+            <a:defPPr>
+              <a:defRPr lang="en-US"/>
+            </a:defPPr>
+            <a:lvl1pPr algn="r">
+              <a:defRPr sz="1400">
+                <a:solidFill>
+                  <a:srgbClr val="0070C0"/>
+                </a:solidFill>
+              </a:defRPr>
+            </a:lvl1pPr>
+          </a:lstStyle>
+          <a:p>
+            <a:pPr algn="ctr"/>
+            <a:r>
+              <a:rPr lang="en-US" sz="900" dirty="0" err="1">
+                <a:solidFill>
+                  <a:schemeClr val="accent4">
+                    <a:lumMod val="75000"/>
+                  </a:schemeClr>
+                </a:solidFill>
+              </a:rPr>
+              <a:t>getFilteredCheckedOutPersonList</a:t>
+            </a:r>
+            <a:r>
+              <a:rPr lang="en-US" sz="900" dirty="0">
+                <a:solidFill>
+                  <a:schemeClr val="accent4">
+                    <a:lumMod val="75000"/>
+                  </a:schemeClr>
+                </a:solidFill>
+              </a:rPr>
+              <a:t>()</a:t>
+            </a:r>
+            <a:endParaRPr lang="en-US" sz="900" dirty="0"/>
+          </a:p>
+        </p:txBody>
+      </p:sp>
+      <p:sp>
+        <p:nvSpPr>
+          <p:cNvPr id="97" name="Rectangle 96">
+            <a:extLst>
+              <a:ext uri="{FF2B5EF4-FFF2-40B4-BE49-F238E27FC236}">
+                <a16:creationId xmlns:a16="http://schemas.microsoft.com/office/drawing/2014/main" id="{E4275444-C404-43C8-BDBC-30F06EB42201}"/>
+              </a:ext>
+            </a:extLst>
+          </p:cNvPr>
+          <p:cNvSpPr/>
+          <p:nvPr/>
+        </p:nvSpPr>
+        <p:spPr>
+          <a:xfrm>
+            <a:off x="9729280" y="3814764"/>
+            <a:ext cx="129023" cy="127621"/>
+          </a:xfrm>
+          <a:prstGeom prst="rect">
+            <a:avLst/>
+          </a:prstGeom>
+          <a:solidFill>
+            <a:srgbClr val="7030A0"/>
+          </a:solidFill>
+          <a:ln>
+            <a:solidFill>
+              <a:srgbClr val="7030A0"/>
+            </a:solidFill>
+          </a:ln>
+          <a:effectLst/>
+        </p:spPr>
+        <p:style>
+          <a:lnRef idx="1">
+            <a:schemeClr val="accent3"/>
+          </a:lnRef>
+          <a:fillRef idx="2">
+            <a:schemeClr val="accent3"/>
+          </a:fillRef>
+          <a:effectRef idx="1">
+            <a:schemeClr val="accent3"/>
+          </a:effectRef>
+          <a:fontRef idx="minor">
+            <a:schemeClr val="dk1"/>
+          </a:fontRef>
+        </p:style>
+        <p:txBody>
+          <a:bodyPr rtlCol="0" anchor="ctr"/>
+          <a:lstStyle/>
+          <a:p>
+            <a:pPr algn="ctr"/>
+            <a:endParaRPr lang="en-SG" sz="1400"/>
+          </a:p>
+        </p:txBody>
+      </p:sp>
+      <p:cxnSp>
+        <p:nvCxnSpPr>
+          <p:cNvPr id="98" name="Straight Arrow Connector 97">
+            <a:extLst>
+              <a:ext uri="{FF2B5EF4-FFF2-40B4-BE49-F238E27FC236}">
+                <a16:creationId xmlns:a16="http://schemas.microsoft.com/office/drawing/2014/main" id="{3C37D6EC-C470-4BD8-A385-2C14DC6B2E3D}"/>
+              </a:ext>
+            </a:extLst>
+          </p:cNvPr>
+          <p:cNvCxnSpPr>
+            <a:cxnSpLocks/>
+          </p:cNvCxnSpPr>
+          <p:nvPr/>
+        </p:nvCxnSpPr>
+        <p:spPr>
+          <a:xfrm flipV="1">
+            <a:off x="8451800" y="3836882"/>
+            <a:ext cx="1291183" cy="1696"/>
+          </a:xfrm>
+          <a:prstGeom prst="straightConnector1">
+            <a:avLst/>
+          </a:prstGeom>
+          <a:ln w="19050">
+            <a:solidFill>
+              <a:srgbClr val="0070C0"/>
+            </a:solidFill>
+            <a:tailEnd type="arrow"/>
+          </a:ln>
+        </p:spPr>
+        <p:style>
+          <a:lnRef idx="1">
+            <a:schemeClr val="accent1"/>
+          </a:lnRef>
+          <a:fillRef idx="0">
+            <a:schemeClr val="accent1"/>
+          </a:fillRef>
+          <a:effectRef idx="0">
+            <a:schemeClr val="accent1"/>
+          </a:effectRef>
+          <a:fontRef idx="minor">
+            <a:schemeClr val="tx1"/>
+          </a:fontRef>
+        </p:style>
+      </p:cxnSp>
+      <p:cxnSp>
+        <p:nvCxnSpPr>
+          <p:cNvPr id="99" name="Straight Arrow Connector 98">
+            <a:extLst>
+              <a:ext uri="{FF2B5EF4-FFF2-40B4-BE49-F238E27FC236}">
+                <a16:creationId xmlns:a16="http://schemas.microsoft.com/office/drawing/2014/main" id="{8F60EB07-0A86-4C9E-9701-AC42EB5FD234}"/>
+              </a:ext>
+            </a:extLst>
+          </p:cNvPr>
+          <p:cNvCxnSpPr>
+            <a:cxnSpLocks/>
+          </p:cNvCxnSpPr>
+          <p:nvPr/>
+        </p:nvCxnSpPr>
+        <p:spPr>
+          <a:xfrm>
+            <a:off x="8539448" y="3943183"/>
+            <a:ext cx="1169231" cy="0"/>
+          </a:xfrm>
+          <a:prstGeom prst="straightConnector1">
+            <a:avLst/>
+          </a:prstGeom>
+          <a:ln w="19050">
+            <a:solidFill>
+              <a:srgbClr val="7030A0"/>
+            </a:solidFill>
+            <a:prstDash val="sysDash"/>
+            <a:headEnd type="arrow" w="med" len="med"/>
+            <a:tailEnd type="none" w="med" len="med"/>
+          </a:ln>
+        </p:spPr>
+        <p:style>
+          <a:lnRef idx="1">
+            <a:schemeClr val="accent1"/>
+          </a:lnRef>
+          <a:fillRef idx="0">
+            <a:schemeClr val="accent1"/>
+          </a:fillRef>
+          <a:effectRef idx="0">
+            <a:schemeClr val="accent1"/>
+          </a:effectRef>
+          <a:fontRef idx="minor">
+            <a:schemeClr val="tx1"/>
+          </a:fontRef>
+        </p:style>
+      </p:cxnSp>
+      <p:sp>
+        <p:nvSpPr>
+          <p:cNvPr id="105" name="TextBox 104">
+            <a:extLst>
+              <a:ext uri="{FF2B5EF4-FFF2-40B4-BE49-F238E27FC236}">
+                <a16:creationId xmlns:a16="http://schemas.microsoft.com/office/drawing/2014/main" id="{6E29B1A5-2D05-4B16-B04D-D1762276D56B}"/>
+              </a:ext>
+            </a:extLst>
+          </p:cNvPr>
+          <p:cNvSpPr txBox="1"/>
+          <p:nvPr/>
+        </p:nvSpPr>
+        <p:spPr>
+          <a:xfrm>
+            <a:off x="8551185" y="3526301"/>
+            <a:ext cx="1221266" cy="107722"/>
+          </a:xfrm>
+          <a:prstGeom prst="rect">
+            <a:avLst/>
+          </a:prstGeom>
+          <a:noFill/>
+        </p:spPr>
+        <p:txBody>
+          <a:bodyPr wrap="square" lIns="0" tIns="0" rIns="0" bIns="0" rtlCol="0">
+            <a:spAutoFit/>
+          </a:bodyPr>
+          <a:lstStyle>
+            <a:defPPr>
+              <a:defRPr lang="en-US"/>
+            </a:defPPr>
+            <a:lvl1pPr algn="r">
+              <a:defRPr sz="1400">
+                <a:solidFill>
+                  <a:srgbClr val="0070C0"/>
+                </a:solidFill>
+              </a:defRPr>
+            </a:lvl1pPr>
+          </a:lstStyle>
+          <a:p>
+            <a:pPr algn="ctr"/>
+            <a:r>
+              <a:rPr lang="en-US" sz="700" dirty="0" err="1">
+                <a:solidFill>
+                  <a:schemeClr val="accent4">
+                    <a:lumMod val="75000"/>
+                  </a:schemeClr>
+                </a:solidFill>
+              </a:rPr>
+              <a:t>matchedCheckedOutPatients</a:t>
+            </a:r>
+            <a:endParaRPr lang="en-US" sz="700" dirty="0"/>
+          </a:p>
+        </p:txBody>
+      </p:sp>
+      <p:sp>
+        <p:nvSpPr>
+          <p:cNvPr id="106" name="TextBox 105">
+            <a:extLst>
+              <a:ext uri="{FF2B5EF4-FFF2-40B4-BE49-F238E27FC236}">
+                <a16:creationId xmlns:a16="http://schemas.microsoft.com/office/drawing/2014/main" id="{6139EB11-3606-4B90-A148-C121EF6E98FB}"/>
+              </a:ext>
+            </a:extLst>
+          </p:cNvPr>
+          <p:cNvSpPr txBox="1"/>
+          <p:nvPr/>
+        </p:nvSpPr>
+        <p:spPr>
+          <a:xfrm>
+            <a:off x="8538130" y="3963790"/>
+            <a:ext cx="1221266" cy="107722"/>
+          </a:xfrm>
+          <a:prstGeom prst="rect">
+            <a:avLst/>
+          </a:prstGeom>
+          <a:noFill/>
+        </p:spPr>
+        <p:txBody>
+          <a:bodyPr wrap="square" lIns="0" tIns="0" rIns="0" bIns="0" rtlCol="0">
+            <a:spAutoFit/>
+          </a:bodyPr>
+          <a:lstStyle>
+            <a:defPPr>
+              <a:defRPr lang="en-US"/>
+            </a:defPPr>
+            <a:lvl1pPr algn="r">
+              <a:defRPr sz="1400">
+                <a:solidFill>
+                  <a:srgbClr val="0070C0"/>
+                </a:solidFill>
+              </a:defRPr>
+            </a:lvl1pPr>
+          </a:lstStyle>
+          <a:p>
+            <a:pPr algn="ctr"/>
+            <a:r>
+              <a:rPr lang="en-US" sz="700" dirty="0" err="1">
+                <a:solidFill>
+                  <a:schemeClr val="accent4">
+                    <a:lumMod val="75000"/>
+                  </a:schemeClr>
+                </a:solidFill>
+              </a:rPr>
+              <a:t>matchedCheckedInPatients</a:t>
+            </a:r>
+            <a:endParaRPr lang="en-US" sz="700" dirty="0"/>
+          </a:p>
+        </p:txBody>
+      </p:sp>
+      <p:sp>
+        <p:nvSpPr>
+          <p:cNvPr id="107" name="TextBox 106">
+            <a:extLst>
+              <a:ext uri="{FF2B5EF4-FFF2-40B4-BE49-F238E27FC236}">
+                <a16:creationId xmlns:a16="http://schemas.microsoft.com/office/drawing/2014/main" id="{4AB2685A-28E7-4BE6-BD27-C0592513C372}"/>
+              </a:ext>
+            </a:extLst>
+          </p:cNvPr>
+          <p:cNvSpPr txBox="1"/>
+          <p:nvPr/>
+        </p:nvSpPr>
+        <p:spPr>
+          <a:xfrm>
+            <a:off x="8645405" y="3700468"/>
+            <a:ext cx="957316" cy="123111"/>
+          </a:xfrm>
+          <a:prstGeom prst="rect">
+            <a:avLst/>
+          </a:prstGeom>
+          <a:noFill/>
+        </p:spPr>
+        <p:txBody>
+          <a:bodyPr wrap="square" lIns="0" tIns="0" rIns="0" bIns="0" rtlCol="0">
+            <a:spAutoFit/>
+          </a:bodyPr>
+          <a:lstStyle>
+            <a:defPPr>
+              <a:defRPr lang="en-US"/>
+            </a:defPPr>
+            <a:lvl1pPr algn="r">
+              <a:defRPr sz="1400">
+                <a:solidFill>
+                  <a:srgbClr val="0070C0"/>
+                </a:solidFill>
+              </a:defRPr>
+            </a:lvl1pPr>
+          </a:lstStyle>
+          <a:p>
+            <a:pPr algn="ctr"/>
+            <a:r>
+              <a:rPr lang="en-US" sz="800" dirty="0" err="1">
+                <a:solidFill>
+                  <a:schemeClr val="accent4">
+                    <a:lumMod val="75000"/>
+                  </a:schemeClr>
+                </a:solidFill>
+              </a:rPr>
+              <a:t>getFilteredPersonList</a:t>
+            </a:r>
+            <a:r>
+              <a:rPr lang="en-US" sz="800" dirty="0">
+                <a:solidFill>
+                  <a:schemeClr val="accent4">
+                    <a:lumMod val="75000"/>
+                  </a:schemeClr>
+                </a:solidFill>
+              </a:rPr>
+              <a:t>()</a:t>
+            </a:r>
+            <a:endParaRPr lang="en-US" sz="800" dirty="0"/>
+          </a:p>
+        </p:txBody>
+      </p:sp>
     </p:spTree>
     <p:extLst>
       <p:ext uri="{BB962C8B-B14F-4D97-AF65-F5344CB8AC3E}">

</xml_diff>